<commit_message>
Savepoint; Fractal and Fibo fully implemented representing a critical inflection point of core metrics; serious regression testing begins now; next up; fibo events calculation ( those data by which orders will be launched by );
</commit_message>
<xml_diff>
--- a/~Documents/FractalFlow.pptx
+++ b/~Documents/FractalFlow.pptx
@@ -6785,13 +6785,16 @@
       <p:cxnSp>
         <p:nvCxnSpPr>
           <p:cNvPr id="160" name="Elbow Connector 159"/>
-          <p:cNvCxnSpPr/>
+          <p:cNvCxnSpPr>
+            <a:stCxn id="145" idx="2"/>
+            <a:endCxn id="157" idx="1"/>
+          </p:cNvCxnSpPr>
           <p:nvPr/>
         </p:nvCxnSpPr>
         <p:spPr>
           <a:xfrm rot="5400000" flipV="1">
-            <a:off x="2959100" y="3807460"/>
-            <a:ext cx="700405" cy="4180205"/>
+            <a:off x="2924175" y="3771900"/>
+            <a:ext cx="770255" cy="4180205"/>
           </a:xfrm>
           <a:prstGeom prst="bentConnector2">
             <a:avLst/>
@@ -6826,7 +6829,7 @@
         </p:nvCxnSpPr>
         <p:spPr>
           <a:xfrm rot="5400000" flipV="1">
-            <a:off x="4367848" y="5216208"/>
+            <a:off x="4367530" y="5215890"/>
             <a:ext cx="666750" cy="1396365"/>
           </a:xfrm>
           <a:prstGeom prst="bentConnector2">
@@ -7541,39 +7544,6 @@
           </a:prstGeom>
         </p:spPr>
       </p:pic>
-      <p:cxnSp>
-        <p:nvCxnSpPr>
-          <p:cNvPr id="180" name="Straight Arrow Connector 179"/>
-          <p:cNvCxnSpPr/>
-          <p:nvPr/>
-        </p:nvCxnSpPr>
-        <p:spPr>
-          <a:xfrm>
-            <a:off x="6771005" y="5356225"/>
-            <a:ext cx="5080" cy="499110"/>
-          </a:xfrm>
-          <a:prstGeom prst="straightConnector1">
-            <a:avLst/>
-          </a:prstGeom>
-          <a:ln>
-            <a:tailEnd type="arrow"/>
-          </a:ln>
-        </p:spPr>
-        <p:style>
-          <a:lnRef idx="1">
-            <a:schemeClr val="accent1"/>
-          </a:lnRef>
-          <a:fillRef idx="0">
-            <a:schemeClr val="accent1"/>
-          </a:fillRef>
-          <a:effectRef idx="0">
-            <a:schemeClr val="accent1"/>
-          </a:effectRef>
-          <a:fontRef idx="minor">
-            <a:schemeClr val="tx1"/>
-          </a:fontRef>
-        </p:style>
-      </p:cxnSp>
       <p:sp>
         <p:nvSpPr>
           <p:cNvPr id="181" name="Flowchart: Decision 180"/>
@@ -10768,6 +10738,76 @@
           </a:p>
         </p:txBody>
       </p:sp>
+      <p:cxnSp>
+        <p:nvCxnSpPr>
+          <p:cNvPr id="281" name="Elbow Connector 280"/>
+          <p:cNvCxnSpPr>
+            <a:stCxn id="251" idx="2"/>
+            <a:endCxn id="128" idx="2"/>
+          </p:cNvCxnSpPr>
+          <p:nvPr/>
+        </p:nvCxnSpPr>
+        <p:spPr>
+          <a:xfrm rot="5400000" flipV="1">
+            <a:off x="6085840" y="4694555"/>
+            <a:ext cx="3175" cy="1370330"/>
+          </a:xfrm>
+          <a:prstGeom prst="bentConnector3">
+            <a:avLst>
+              <a:gd name="adj1" fmla="val 7550000"/>
+            </a:avLst>
+          </a:prstGeom>
+        </p:spPr>
+        <p:style>
+          <a:lnRef idx="1">
+            <a:schemeClr val="accent1"/>
+          </a:lnRef>
+          <a:fillRef idx="0">
+            <a:schemeClr val="accent1"/>
+          </a:fillRef>
+          <a:effectRef idx="0">
+            <a:schemeClr val="accent1"/>
+          </a:effectRef>
+          <a:fontRef idx="minor">
+            <a:schemeClr val="tx1"/>
+          </a:fontRef>
+        </p:style>
+      </p:cxnSp>
+      <p:cxnSp>
+        <p:nvCxnSpPr>
+          <p:cNvPr id="282" name="Straight Arrow Connector 281"/>
+          <p:cNvCxnSpPr>
+            <a:endCxn id="155" idx="0"/>
+          </p:cNvCxnSpPr>
+          <p:nvPr/>
+        </p:nvCxnSpPr>
+        <p:spPr>
+          <a:xfrm flipH="1">
+            <a:off x="6158865" y="5608320"/>
+            <a:ext cx="4445" cy="247015"/>
+          </a:xfrm>
+          <a:prstGeom prst="straightConnector1">
+            <a:avLst/>
+          </a:prstGeom>
+          <a:ln>
+            <a:tailEnd type="arrow"/>
+          </a:ln>
+        </p:spPr>
+        <p:style>
+          <a:lnRef idx="1">
+            <a:schemeClr val="accent1"/>
+          </a:lnRef>
+          <a:fillRef idx="0">
+            <a:schemeClr val="accent1"/>
+          </a:fillRef>
+          <a:effectRef idx="0">
+            <a:schemeClr val="accent1"/>
+          </a:effectRef>
+          <a:fontRef idx="minor">
+            <a:schemeClr val="tx1"/>
+          </a:fontRef>
+        </p:style>
+      </p:cxnSp>
     </p:spTree>
   </p:cSld>
   <p:clrMapOvr>

</xml_diff>

<commit_message>
Working; built out a rudimentary logging facility to support visual validation of events/fractal/fibo triggers; crypto-analysis.xlsx produces the visuals (for now) - XRP(2) tab shows the candlestick chart and events with some events are missing requiring validation; good working start to a full-regression test of expansion and fibo extension formulas;
</commit_message>
<xml_diff>
--- a/~Documents/FractalFlow.pptx
+++ b/~Documents/FractalFlow.pptx
@@ -5,13 +5,14 @@
     <p:sldMasterId id="2147483648" r:id="rId1"/>
   </p:sldMasterIdLst>
   <p:notesMasterIdLst>
-    <p:notesMasterId r:id="rId4"/>
+    <p:notesMasterId r:id="rId5"/>
   </p:notesMasterIdLst>
   <p:handoutMasterIdLst>
-    <p:handoutMasterId r:id="rId5"/>
+    <p:handoutMasterId r:id="rId6"/>
   </p:handoutMasterIdLst>
   <p:sldIdLst>
     <p:sldId id="256" r:id="rId3"/>
+    <p:sldId id="258" r:id="rId4"/>
   </p:sldIdLst>
   <p:sldSz cx="12192000" cy="6858000"/>
   <p:notesSz cx="7103745" cy="10234295"/>
@@ -10808,6 +10809,2465 @@
           </a:fontRef>
         </p:style>
       </p:cxnSp>
+    </p:spTree>
+  </p:cSld>
+  <p:clrMapOvr>
+    <a:masterClrMapping/>
+  </p:clrMapOvr>
+</p:sld>
+</file>
+
+<file path=ppt/slides/slide2.xml><?xml version="1.0" encoding="utf-8"?>
+<p:sld xmlns:a="http://schemas.openxmlformats.org/drawingml/2006/main" xmlns:r="http://schemas.openxmlformats.org/officeDocument/2006/relationships" xmlns:p="http://schemas.openxmlformats.org/presentationml/2006/main">
+  <p:cSld>
+    <p:spTree>
+      <p:nvGrpSpPr>
+        <p:cNvPr id="1" name=""/>
+        <p:cNvGrpSpPr/>
+        <p:nvPr/>
+      </p:nvGrpSpPr>
+      <p:grpSpPr/>
+      <p:cxnSp>
+        <p:nvCxnSpPr>
+          <p:cNvPr id="50" name="Straight Arrow Connector 49"/>
+          <p:cNvCxnSpPr>
+            <a:stCxn id="9" idx="2"/>
+            <a:endCxn id="12" idx="0"/>
+          </p:cNvCxnSpPr>
+          <p:nvPr/>
+        </p:nvCxnSpPr>
+        <p:spPr>
+          <a:xfrm flipH="1">
+            <a:off x="1708785" y="1244600"/>
+            <a:ext cx="3175" cy="2244090"/>
+          </a:xfrm>
+          <a:prstGeom prst="straightConnector1">
+            <a:avLst/>
+          </a:prstGeom>
+          <a:ln>
+            <a:tailEnd type="arrow"/>
+          </a:ln>
+        </p:spPr>
+        <p:style>
+          <a:lnRef idx="1">
+            <a:schemeClr val="accent1"/>
+          </a:lnRef>
+          <a:fillRef idx="0">
+            <a:schemeClr val="accent1"/>
+          </a:fillRef>
+          <a:effectRef idx="0">
+            <a:schemeClr val="accent1"/>
+          </a:effectRef>
+          <a:fontRef idx="minor">
+            <a:schemeClr val="tx1"/>
+          </a:fontRef>
+        </p:style>
+      </p:cxnSp>
+      <p:sp>
+        <p:nvSpPr>
+          <p:cNvPr id="169" name="Flowchart: Off-page Connector 168"/>
+          <p:cNvSpPr/>
+          <p:nvPr/>
+        </p:nvSpPr>
+        <p:spPr>
+          <a:xfrm>
+            <a:off x="470535" y="290830"/>
+            <a:ext cx="300990" cy="318770"/>
+          </a:xfrm>
+          <a:prstGeom prst="flowChartOffpageConnector">
+            <a:avLst/>
+          </a:prstGeom>
+          <a:solidFill>
+            <a:schemeClr val="accent1">
+              <a:lumMod val="60000"/>
+              <a:lumOff val="40000"/>
+            </a:schemeClr>
+          </a:solidFill>
+        </p:spPr>
+        <p:style>
+          <a:lnRef idx="2">
+            <a:schemeClr val="accent1">
+              <a:shade val="50000"/>
+            </a:schemeClr>
+          </a:lnRef>
+          <a:fillRef idx="1">
+            <a:schemeClr val="accent1"/>
+          </a:fillRef>
+          <a:effectRef idx="0">
+            <a:schemeClr val="accent1"/>
+          </a:effectRef>
+          <a:fontRef idx="minor">
+            <a:schemeClr val="lt1"/>
+          </a:fontRef>
+        </p:style>
+        <p:txBody>
+          <a:bodyPr rtlCol="0" anchor="ctr"/>
+          <a:p>
+            <a:pPr algn="ctr"/>
+            <a:r>
+              <a:rPr lang="en-US" sz="1200"/>
+              <a:t>2</a:t>
+            </a:r>
+            <a:endParaRPr lang="en-US" sz="1200"/>
+          </a:p>
+        </p:txBody>
+      </p:sp>
+      <p:sp>
+        <p:nvSpPr>
+          <p:cNvPr id="6" name="Flowchart: Data 5"/>
+          <p:cNvSpPr/>
+          <p:nvPr/>
+        </p:nvSpPr>
+        <p:spPr>
+          <a:xfrm>
+            <a:off x="145415" y="855345"/>
+            <a:ext cx="951865" cy="420370"/>
+          </a:xfrm>
+          <a:prstGeom prst="flowChartInputOutput">
+            <a:avLst/>
+          </a:prstGeom>
+          <a:solidFill>
+            <a:schemeClr val="accent6">
+              <a:lumMod val="40000"/>
+              <a:lumOff val="60000"/>
+            </a:schemeClr>
+          </a:solidFill>
+        </p:spPr>
+        <p:style>
+          <a:lnRef idx="2">
+            <a:schemeClr val="accent6"/>
+          </a:lnRef>
+          <a:fillRef idx="1">
+            <a:schemeClr val="lt1"/>
+          </a:fillRef>
+          <a:effectRef idx="0">
+            <a:schemeClr val="accent6"/>
+          </a:effectRef>
+          <a:fontRef idx="minor">
+            <a:schemeClr val="dk1"/>
+          </a:fontRef>
+        </p:style>
+        <p:txBody>
+          <a:bodyPr rtlCol="0" anchor="ctr"/>
+          <a:p>
+            <a:pPr algn="ctr"/>
+            <a:r>
+              <a:rPr lang="en-US" sz="800">
+                <a:solidFill>
+                  <a:schemeClr val="tx1">
+                    <a:lumMod val="75000"/>
+                    <a:lumOff val="25000"/>
+                  </a:schemeClr>
+                </a:solidFill>
+              </a:rPr>
+              <a:t>Fractal</a:t>
+            </a:r>
+            <a:endParaRPr lang="en-US" sz="800">
+              <a:solidFill>
+                <a:schemeClr val="tx1">
+                  <a:lumMod val="75000"/>
+                  <a:lumOff val="25000"/>
+                </a:schemeClr>
+              </a:solidFill>
+            </a:endParaRPr>
+          </a:p>
+        </p:txBody>
+      </p:sp>
+      <p:sp>
+        <p:nvSpPr>
+          <p:cNvPr id="9" name="Flowchart: Decision 8"/>
+          <p:cNvSpPr/>
+          <p:nvPr/>
+        </p:nvSpPr>
+        <p:spPr>
+          <a:xfrm>
+            <a:off x="1292860" y="877571"/>
+            <a:ext cx="837565" cy="367029"/>
+          </a:xfrm>
+          <a:prstGeom prst="flowChartDecision">
+            <a:avLst/>
+          </a:prstGeom>
+        </p:spPr>
+        <p:style>
+          <a:lnRef idx="1">
+            <a:schemeClr val="accent4"/>
+          </a:lnRef>
+          <a:fillRef idx="2">
+            <a:schemeClr val="accent4"/>
+          </a:fillRef>
+          <a:effectRef idx="1">
+            <a:schemeClr val="accent4"/>
+          </a:effectRef>
+          <a:fontRef idx="minor">
+            <a:schemeClr val="dk1"/>
+          </a:fontRef>
+        </p:style>
+        <p:txBody>
+          <a:bodyPr wrap="square" lIns="0" rIns="0" rtlCol="0" anchor="ctr">
+            <a:spAutoFit/>
+          </a:bodyPr>
+          <a:p>
+            <a:pPr algn="ctr"/>
+            <a:r>
+              <a:rPr lang="en-US" sz="600"/>
+              <a:t>Expansion?</a:t>
+            </a:r>
+            <a:endParaRPr lang="en-US" sz="600"/>
+          </a:p>
+        </p:txBody>
+      </p:sp>
+      <p:cxnSp>
+        <p:nvCxnSpPr>
+          <p:cNvPr id="10" name="Straight Arrow Connector 9"/>
+          <p:cNvCxnSpPr>
+            <a:stCxn id="79" idx="1"/>
+            <a:endCxn id="11" idx="6"/>
+          </p:cNvCxnSpPr>
+          <p:nvPr/>
+        </p:nvCxnSpPr>
+        <p:spPr>
+          <a:xfrm flipH="1">
+            <a:off x="1790065" y="3153410"/>
+            <a:ext cx="1449070" cy="1270"/>
+          </a:xfrm>
+          <a:prstGeom prst="straightConnector1">
+            <a:avLst/>
+          </a:prstGeom>
+          <a:ln>
+            <a:tailEnd type="arrow"/>
+          </a:ln>
+        </p:spPr>
+        <p:style>
+          <a:lnRef idx="1">
+            <a:schemeClr val="accent1"/>
+          </a:lnRef>
+          <a:fillRef idx="0">
+            <a:schemeClr val="accent1"/>
+          </a:fillRef>
+          <a:effectRef idx="0">
+            <a:schemeClr val="accent1"/>
+          </a:effectRef>
+          <a:fontRef idx="minor">
+            <a:schemeClr val="tx1"/>
+          </a:fontRef>
+        </p:style>
+      </p:cxnSp>
+      <p:sp>
+        <p:nvSpPr>
+          <p:cNvPr id="11" name="Oval 10"/>
+          <p:cNvSpPr/>
+          <p:nvPr/>
+        </p:nvSpPr>
+        <p:spPr>
+          <a:xfrm>
+            <a:off x="1625600" y="3065780"/>
+            <a:ext cx="164465" cy="177165"/>
+          </a:xfrm>
+          <a:prstGeom prst="ellipse">
+            <a:avLst/>
+          </a:prstGeom>
+        </p:spPr>
+        <p:style>
+          <a:lnRef idx="1">
+            <a:schemeClr val="accent2"/>
+          </a:lnRef>
+          <a:fillRef idx="2">
+            <a:schemeClr val="accent2"/>
+          </a:fillRef>
+          <a:effectRef idx="1">
+            <a:schemeClr val="accent2"/>
+          </a:effectRef>
+          <a:fontRef idx="minor">
+            <a:schemeClr val="dk1"/>
+          </a:fontRef>
+        </p:style>
+        <p:txBody>
+          <a:bodyPr rtlCol="0" anchor="ctr"/>
+          <a:p>
+            <a:pPr algn="ctr"/>
+            <a:r>
+              <a:rPr lang="en-US" sz="700"/>
+              <a:t>n</a:t>
+            </a:r>
+            <a:endParaRPr lang="en-US" sz="700"/>
+          </a:p>
+        </p:txBody>
+      </p:sp>
+      <p:cxnSp>
+        <p:nvCxnSpPr>
+          <p:cNvPr id="183" name="Straight Arrow Connector 182"/>
+          <p:cNvCxnSpPr>
+            <a:stCxn id="9" idx="3"/>
+            <a:endCxn id="84" idx="1"/>
+          </p:cNvCxnSpPr>
+          <p:nvPr/>
+        </p:nvCxnSpPr>
+        <p:spPr>
+          <a:xfrm>
+            <a:off x="2130425" y="1061085"/>
+            <a:ext cx="620395" cy="8890"/>
+          </a:xfrm>
+          <a:prstGeom prst="straightConnector1">
+            <a:avLst/>
+          </a:prstGeom>
+          <a:ln>
+            <a:tailEnd type="arrow"/>
+          </a:ln>
+        </p:spPr>
+        <p:style>
+          <a:lnRef idx="1">
+            <a:schemeClr val="accent1"/>
+          </a:lnRef>
+          <a:fillRef idx="0">
+            <a:schemeClr val="accent1"/>
+          </a:fillRef>
+          <a:effectRef idx="0">
+            <a:schemeClr val="accent1"/>
+          </a:effectRef>
+          <a:fontRef idx="minor">
+            <a:schemeClr val="tx1"/>
+          </a:fontRef>
+        </p:style>
+      </p:cxnSp>
+      <p:sp>
+        <p:nvSpPr>
+          <p:cNvPr id="107" name="Oval 106"/>
+          <p:cNvSpPr/>
+          <p:nvPr/>
+        </p:nvSpPr>
+        <p:spPr>
+          <a:xfrm>
+            <a:off x="2311400" y="975995"/>
+            <a:ext cx="164465" cy="177165"/>
+          </a:xfrm>
+          <a:prstGeom prst="ellipse">
+            <a:avLst/>
+          </a:prstGeom>
+        </p:spPr>
+        <p:style>
+          <a:lnRef idx="1">
+            <a:schemeClr val="accent2"/>
+          </a:lnRef>
+          <a:fillRef idx="2">
+            <a:schemeClr val="accent2"/>
+          </a:fillRef>
+          <a:effectRef idx="1">
+            <a:schemeClr val="accent2"/>
+          </a:effectRef>
+          <a:fontRef idx="minor">
+            <a:schemeClr val="dk1"/>
+          </a:fontRef>
+        </p:style>
+        <p:txBody>
+          <a:bodyPr rtlCol="0" anchor="ctr"/>
+          <a:p>
+            <a:pPr algn="ctr"/>
+            <a:r>
+              <a:rPr lang="en-US" sz="700"/>
+              <a:t>y</a:t>
+            </a:r>
+            <a:endParaRPr lang="en-US" sz="700"/>
+          </a:p>
+        </p:txBody>
+      </p:sp>
+      <p:sp>
+        <p:nvSpPr>
+          <p:cNvPr id="12" name="Flowchart: Decision 11"/>
+          <p:cNvSpPr/>
+          <p:nvPr/>
+        </p:nvSpPr>
+        <p:spPr>
+          <a:xfrm>
+            <a:off x="1289685" y="3488731"/>
+            <a:ext cx="837565" cy="539669"/>
+          </a:xfrm>
+          <a:prstGeom prst="flowChartDecision">
+            <a:avLst/>
+          </a:prstGeom>
+        </p:spPr>
+        <p:style>
+          <a:lnRef idx="1">
+            <a:schemeClr val="accent4"/>
+          </a:lnRef>
+          <a:fillRef idx="2">
+            <a:schemeClr val="accent4"/>
+          </a:fillRef>
+          <a:effectRef idx="1">
+            <a:schemeClr val="accent4"/>
+          </a:effectRef>
+          <a:fontRef idx="minor">
+            <a:schemeClr val="dk1"/>
+          </a:fontRef>
+        </p:style>
+        <p:txBody>
+          <a:bodyPr wrap="square" lIns="0" rIns="0" rtlCol="0" anchor="ctr">
+            <a:spAutoFit/>
+          </a:bodyPr>
+          <a:p>
+            <a:pPr algn="ctr"/>
+            <a:r>
+              <a:rPr lang="en-US" sz="600"/>
+              <a:t>Retrace &lt; max?</a:t>
+            </a:r>
+            <a:endParaRPr lang="en-US" sz="600"/>
+          </a:p>
+        </p:txBody>
+      </p:sp>
+      <p:sp>
+        <p:nvSpPr>
+          <p:cNvPr id="13" name="Flowchart: Decision 12"/>
+          <p:cNvSpPr/>
+          <p:nvPr/>
+        </p:nvSpPr>
+        <p:spPr>
+          <a:xfrm>
+            <a:off x="5946140" y="1241514"/>
+            <a:ext cx="837565" cy="549734"/>
+          </a:xfrm>
+          <a:prstGeom prst="flowChartDecision">
+            <a:avLst/>
+          </a:prstGeom>
+        </p:spPr>
+        <p:style>
+          <a:lnRef idx="1">
+            <a:schemeClr val="accent4"/>
+          </a:lnRef>
+          <a:fillRef idx="2">
+            <a:schemeClr val="accent4"/>
+          </a:fillRef>
+          <a:effectRef idx="1">
+            <a:schemeClr val="accent4"/>
+          </a:effectRef>
+          <a:fontRef idx="minor">
+            <a:schemeClr val="dk1"/>
+          </a:fontRef>
+        </p:style>
+        <p:txBody>
+          <a:bodyPr wrap="square" lIns="0" rIns="0" rtlCol="0" anchor="ctr">
+            <a:spAutoFit/>
+          </a:bodyPr>
+          <a:p>
+            <a:pPr algn="ctr"/>
+            <a:r>
+              <a:rPr lang="en-US" sz="600"/>
+              <a:t>Extension&lt; max?</a:t>
+            </a:r>
+            <a:endParaRPr lang="en-US" sz="600"/>
+          </a:p>
+        </p:txBody>
+      </p:sp>
+      <p:cxnSp>
+        <p:nvCxnSpPr>
+          <p:cNvPr id="16" name="Straight Arrow Connector 15"/>
+          <p:cNvCxnSpPr>
+            <a:stCxn id="13" idx="3"/>
+          </p:cNvCxnSpPr>
+          <p:nvPr/>
+        </p:nvCxnSpPr>
+        <p:spPr>
+          <a:xfrm flipV="1">
+            <a:off x="6783705" y="1511935"/>
+            <a:ext cx="537210" cy="4445"/>
+          </a:xfrm>
+          <a:prstGeom prst="straightConnector1">
+            <a:avLst/>
+          </a:prstGeom>
+          <a:ln>
+            <a:tailEnd type="arrow"/>
+          </a:ln>
+        </p:spPr>
+        <p:style>
+          <a:lnRef idx="1">
+            <a:schemeClr val="accent1"/>
+          </a:lnRef>
+          <a:fillRef idx="0">
+            <a:schemeClr val="accent1"/>
+          </a:fillRef>
+          <a:effectRef idx="0">
+            <a:schemeClr val="accent1"/>
+          </a:effectRef>
+          <a:fontRef idx="minor">
+            <a:schemeClr val="tx1"/>
+          </a:fontRef>
+        </p:style>
+      </p:cxnSp>
+      <p:sp>
+        <p:nvSpPr>
+          <p:cNvPr id="17" name="Oval 16"/>
+          <p:cNvSpPr/>
+          <p:nvPr/>
+        </p:nvSpPr>
+        <p:spPr>
+          <a:xfrm>
+            <a:off x="6968490" y="1430020"/>
+            <a:ext cx="164465" cy="177165"/>
+          </a:xfrm>
+          <a:prstGeom prst="ellipse">
+            <a:avLst/>
+          </a:prstGeom>
+        </p:spPr>
+        <p:style>
+          <a:lnRef idx="1">
+            <a:schemeClr val="accent2"/>
+          </a:lnRef>
+          <a:fillRef idx="2">
+            <a:schemeClr val="accent2"/>
+          </a:fillRef>
+          <a:effectRef idx="1">
+            <a:schemeClr val="accent2"/>
+          </a:effectRef>
+          <a:fontRef idx="minor">
+            <a:schemeClr val="dk1"/>
+          </a:fontRef>
+        </p:style>
+        <p:txBody>
+          <a:bodyPr rtlCol="0" anchor="ctr"/>
+          <a:p>
+            <a:pPr algn="ctr"/>
+            <a:r>
+              <a:rPr lang="en-US" sz="700"/>
+              <a:t>y</a:t>
+            </a:r>
+            <a:endParaRPr lang="en-US" sz="700"/>
+          </a:p>
+        </p:txBody>
+      </p:sp>
+      <p:cxnSp>
+        <p:nvCxnSpPr>
+          <p:cNvPr id="18" name="Elbow Connector 17"/>
+          <p:cNvCxnSpPr>
+            <a:stCxn id="91" idx="3"/>
+            <a:endCxn id="13" idx="1"/>
+          </p:cNvCxnSpPr>
+          <p:nvPr/>
+        </p:nvCxnSpPr>
+        <p:spPr>
+          <a:xfrm>
+            <a:off x="5327015" y="1065530"/>
+            <a:ext cx="619125" cy="450850"/>
+          </a:xfrm>
+          <a:prstGeom prst="bentConnector3">
+            <a:avLst>
+              <a:gd name="adj1" fmla="val 50051"/>
+            </a:avLst>
+          </a:prstGeom>
+          <a:ln>
+            <a:tailEnd type="arrow"/>
+          </a:ln>
+        </p:spPr>
+        <p:style>
+          <a:lnRef idx="1">
+            <a:schemeClr val="accent1"/>
+          </a:lnRef>
+          <a:fillRef idx="0">
+            <a:schemeClr val="accent1"/>
+          </a:fillRef>
+          <a:effectRef idx="0">
+            <a:schemeClr val="accent1"/>
+          </a:effectRef>
+          <a:fontRef idx="minor">
+            <a:schemeClr val="tx1"/>
+          </a:fontRef>
+        </p:style>
+      </p:cxnSp>
+      <p:grpSp>
+        <p:nvGrpSpPr>
+          <p:cNvPr id="99" name="Group 98"/>
+          <p:cNvGrpSpPr/>
+          <p:nvPr/>
+        </p:nvGrpSpPr>
+        <p:grpSpPr>
+          <a:xfrm>
+            <a:off x="4149090" y="829310"/>
+            <a:ext cx="1177925" cy="637540"/>
+            <a:chOff x="1542" y="6592"/>
+            <a:chExt cx="1855" cy="1004"/>
+          </a:xfrm>
+        </p:grpSpPr>
+        <p:sp>
+          <p:nvSpPr>
+            <p:cNvPr id="90" name="Rectangles 89"/>
+            <p:cNvSpPr/>
+            <p:nvPr/>
+          </p:nvSpPr>
+          <p:spPr>
+            <a:xfrm>
+              <a:off x="1542" y="6592"/>
+              <a:ext cx="1855" cy="226"/>
+            </a:xfrm>
+            <a:prstGeom prst="rect">
+              <a:avLst/>
+            </a:prstGeom>
+          </p:spPr>
+          <p:style>
+            <a:lnRef idx="2">
+              <a:schemeClr val="dk1">
+                <a:shade val="50000"/>
+              </a:schemeClr>
+            </a:lnRef>
+            <a:fillRef idx="1">
+              <a:schemeClr val="dk1"/>
+            </a:fillRef>
+            <a:effectRef idx="0">
+              <a:schemeClr val="dk1"/>
+            </a:effectRef>
+            <a:fontRef idx="minor">
+              <a:schemeClr val="lt1"/>
+            </a:fontRef>
+          </p:style>
+          <p:txBody>
+            <a:bodyPr rtlCol="0" anchor="ctr"/>
+            <a:p>
+              <a:pPr algn="ctr"/>
+              <a:r>
+                <a:rPr lang="en-US" sz="800"/>
+                <a:t>Reversal</a:t>
+              </a:r>
+              <a:endParaRPr lang="en-US" sz="800"/>
+            </a:p>
+          </p:txBody>
+        </p:sp>
+        <p:sp>
+          <p:nvSpPr>
+            <p:cNvPr id="91" name="Rectangles 90"/>
+            <p:cNvSpPr/>
+            <p:nvPr/>
+          </p:nvSpPr>
+          <p:spPr>
+            <a:xfrm>
+              <a:off x="1542" y="6851"/>
+              <a:ext cx="1855" cy="226"/>
+            </a:xfrm>
+            <a:prstGeom prst="rect">
+              <a:avLst/>
+            </a:prstGeom>
+          </p:spPr>
+          <p:style>
+            <a:lnRef idx="2">
+              <a:schemeClr val="accent1">
+                <a:shade val="50000"/>
+              </a:schemeClr>
+            </a:lnRef>
+            <a:fillRef idx="1">
+              <a:schemeClr val="accent1"/>
+            </a:fillRef>
+            <a:effectRef idx="0">
+              <a:schemeClr val="accent1"/>
+            </a:effectRef>
+            <a:fontRef idx="minor">
+              <a:schemeClr val="lt1"/>
+            </a:fontRef>
+          </p:style>
+          <p:txBody>
+            <a:bodyPr rtlCol="0" anchor="ctr"/>
+            <a:p>
+              <a:pPr algn="ctr"/>
+              <a:r>
+                <a:rPr lang="en-US" sz="800"/>
+                <a:t>setEvent()</a:t>
+              </a:r>
+              <a:endParaRPr lang="en-US" sz="800"/>
+            </a:p>
+          </p:txBody>
+        </p:sp>
+        <p:sp>
+          <p:nvSpPr>
+            <p:cNvPr id="92" name="Rectangles 91"/>
+            <p:cNvSpPr/>
+            <p:nvPr/>
+          </p:nvSpPr>
+          <p:spPr>
+            <a:xfrm>
+              <a:off x="1542" y="7111"/>
+              <a:ext cx="1855" cy="226"/>
+            </a:xfrm>
+            <a:prstGeom prst="rect">
+              <a:avLst/>
+            </a:prstGeom>
+          </p:spPr>
+          <p:style>
+            <a:lnRef idx="2">
+              <a:schemeClr val="accent1">
+                <a:shade val="50000"/>
+              </a:schemeClr>
+            </a:lnRef>
+            <a:fillRef idx="1">
+              <a:schemeClr val="accent1"/>
+            </a:fillRef>
+            <a:effectRef idx="0">
+              <a:schemeClr val="accent1"/>
+            </a:effectRef>
+            <a:fontRef idx="minor">
+              <a:schemeClr val="lt1"/>
+            </a:fontRef>
+          </p:style>
+          <p:txBody>
+            <a:bodyPr rtlCol="0" anchor="ctr"/>
+            <a:p>
+              <a:pPr algn="ctr"/>
+              <a:endParaRPr lang="en-US" sz="800"/>
+            </a:p>
+          </p:txBody>
+        </p:sp>
+        <p:sp>
+          <p:nvSpPr>
+            <p:cNvPr id="93" name="Rectangles 92"/>
+            <p:cNvSpPr/>
+            <p:nvPr/>
+          </p:nvSpPr>
+          <p:spPr>
+            <a:xfrm>
+              <a:off x="1542" y="7370"/>
+              <a:ext cx="1855" cy="226"/>
+            </a:xfrm>
+            <a:prstGeom prst="rect">
+              <a:avLst/>
+            </a:prstGeom>
+          </p:spPr>
+          <p:style>
+            <a:lnRef idx="2">
+              <a:schemeClr val="accent1">
+                <a:shade val="50000"/>
+              </a:schemeClr>
+            </a:lnRef>
+            <a:fillRef idx="1">
+              <a:schemeClr val="accent1"/>
+            </a:fillRef>
+            <a:effectRef idx="0">
+              <a:schemeClr val="accent1"/>
+            </a:effectRef>
+            <a:fontRef idx="minor">
+              <a:schemeClr val="lt1"/>
+            </a:fontRef>
+          </p:style>
+          <p:txBody>
+            <a:bodyPr rtlCol="0" anchor="ctr"/>
+            <a:p>
+              <a:pPr algn="ctr"/>
+              <a:r>
+                <a:rPr lang="en-US" sz="800">
+                  <a:sym typeface="+mn-ea"/>
+                </a:rPr>
+                <a:t>postReport()</a:t>
+              </a:r>
+              <a:endParaRPr lang="en-US" sz="800"/>
+            </a:p>
+          </p:txBody>
+        </p:sp>
+      </p:grpSp>
+      <p:cxnSp>
+        <p:nvCxnSpPr>
+          <p:cNvPr id="38" name="Straight Arrow Connector 37"/>
+          <p:cNvCxnSpPr>
+            <a:stCxn id="12" idx="3"/>
+            <a:endCxn id="42" idx="1"/>
+          </p:cNvCxnSpPr>
+          <p:nvPr/>
+        </p:nvCxnSpPr>
+        <p:spPr>
+          <a:xfrm>
+            <a:off x="2127250" y="3758565"/>
+            <a:ext cx="758825" cy="4445"/>
+          </a:xfrm>
+          <a:prstGeom prst="straightConnector1">
+            <a:avLst/>
+          </a:prstGeom>
+          <a:ln>
+            <a:tailEnd type="arrow"/>
+          </a:ln>
+        </p:spPr>
+        <p:style>
+          <a:lnRef idx="1">
+            <a:schemeClr val="accent1"/>
+          </a:lnRef>
+          <a:fillRef idx="0">
+            <a:schemeClr val="accent1"/>
+          </a:fillRef>
+          <a:effectRef idx="0">
+            <a:schemeClr val="accent1"/>
+          </a:effectRef>
+          <a:fontRef idx="minor">
+            <a:schemeClr val="tx1"/>
+          </a:fontRef>
+        </p:style>
+      </p:cxnSp>
+      <p:sp>
+        <p:nvSpPr>
+          <p:cNvPr id="39" name="Oval 38"/>
+          <p:cNvSpPr/>
+          <p:nvPr/>
+        </p:nvSpPr>
+        <p:spPr>
+          <a:xfrm>
+            <a:off x="2347595" y="3670300"/>
+            <a:ext cx="164465" cy="177165"/>
+          </a:xfrm>
+          <a:prstGeom prst="ellipse">
+            <a:avLst/>
+          </a:prstGeom>
+        </p:spPr>
+        <p:style>
+          <a:lnRef idx="1">
+            <a:schemeClr val="accent2"/>
+          </a:lnRef>
+          <a:fillRef idx="2">
+            <a:schemeClr val="accent2"/>
+          </a:fillRef>
+          <a:effectRef idx="1">
+            <a:schemeClr val="accent2"/>
+          </a:effectRef>
+          <a:fontRef idx="minor">
+            <a:schemeClr val="dk1"/>
+          </a:fontRef>
+        </p:style>
+        <p:txBody>
+          <a:bodyPr rtlCol="0" anchor="ctr"/>
+          <a:p>
+            <a:pPr algn="ctr"/>
+            <a:r>
+              <a:rPr lang="en-US" sz="700"/>
+              <a:t>y</a:t>
+            </a:r>
+            <a:endParaRPr lang="en-US" sz="700"/>
+          </a:p>
+        </p:txBody>
+      </p:sp>
+      <p:grpSp>
+        <p:nvGrpSpPr>
+          <p:cNvPr id="40" name="Group 39"/>
+          <p:cNvGrpSpPr/>
+          <p:nvPr/>
+        </p:nvGrpSpPr>
+        <p:grpSpPr>
+          <a:xfrm>
+            <a:off x="2886075" y="3526790"/>
+            <a:ext cx="1177925" cy="637540"/>
+            <a:chOff x="1542" y="6592"/>
+            <a:chExt cx="1855" cy="1004"/>
+          </a:xfrm>
+        </p:grpSpPr>
+        <p:sp>
+          <p:nvSpPr>
+            <p:cNvPr id="41" name="Rectangles 40"/>
+            <p:cNvSpPr/>
+            <p:nvPr/>
+          </p:nvSpPr>
+          <p:spPr>
+            <a:xfrm>
+              <a:off x="1542" y="6592"/>
+              <a:ext cx="1855" cy="226"/>
+            </a:xfrm>
+            <a:prstGeom prst="rect">
+              <a:avLst/>
+            </a:prstGeom>
+          </p:spPr>
+          <p:style>
+            <a:lnRef idx="2">
+              <a:schemeClr val="dk1">
+                <a:shade val="50000"/>
+              </a:schemeClr>
+            </a:lnRef>
+            <a:fillRef idx="1">
+              <a:schemeClr val="dk1"/>
+            </a:fillRef>
+            <a:effectRef idx="0">
+              <a:schemeClr val="dk1"/>
+            </a:effectRef>
+            <a:fontRef idx="minor">
+              <a:schemeClr val="lt1"/>
+            </a:fontRef>
+          </p:style>
+          <p:txBody>
+            <a:bodyPr rtlCol="0" anchor="ctr"/>
+            <a:p>
+              <a:pPr algn="ctr"/>
+              <a:r>
+                <a:rPr lang="en-US" sz="800"/>
+                <a:t>Retrace</a:t>
+              </a:r>
+              <a:endParaRPr lang="en-US" sz="800"/>
+            </a:p>
+          </p:txBody>
+        </p:sp>
+        <p:sp>
+          <p:nvSpPr>
+            <p:cNvPr id="42" name="Rectangles 41"/>
+            <p:cNvSpPr/>
+            <p:nvPr/>
+          </p:nvSpPr>
+          <p:spPr>
+            <a:xfrm>
+              <a:off x="1542" y="6851"/>
+              <a:ext cx="1855" cy="226"/>
+            </a:xfrm>
+            <a:prstGeom prst="rect">
+              <a:avLst/>
+            </a:prstGeom>
+          </p:spPr>
+          <p:style>
+            <a:lnRef idx="2">
+              <a:schemeClr val="accent1">
+                <a:shade val="50000"/>
+              </a:schemeClr>
+            </a:lnRef>
+            <a:fillRef idx="1">
+              <a:schemeClr val="accent1"/>
+            </a:fillRef>
+            <a:effectRef idx="0">
+              <a:schemeClr val="accent1"/>
+            </a:effectRef>
+            <a:fontRef idx="minor">
+              <a:schemeClr val="lt1"/>
+            </a:fontRef>
+          </p:style>
+          <p:txBody>
+            <a:bodyPr rtlCol="0" anchor="ctr"/>
+            <a:p>
+              <a:pPr algn="ctr"/>
+              <a:r>
+                <a:rPr lang="en-US" sz="800"/>
+                <a:t>setEvent()</a:t>
+              </a:r>
+              <a:endParaRPr lang="en-US" sz="800"/>
+            </a:p>
+          </p:txBody>
+        </p:sp>
+        <p:sp>
+          <p:nvSpPr>
+            <p:cNvPr id="43" name="Rectangles 42"/>
+            <p:cNvSpPr/>
+            <p:nvPr/>
+          </p:nvSpPr>
+          <p:spPr>
+            <a:xfrm>
+              <a:off x="1542" y="7111"/>
+              <a:ext cx="1855" cy="226"/>
+            </a:xfrm>
+            <a:prstGeom prst="rect">
+              <a:avLst/>
+            </a:prstGeom>
+          </p:spPr>
+          <p:style>
+            <a:lnRef idx="2">
+              <a:schemeClr val="accent1">
+                <a:shade val="50000"/>
+              </a:schemeClr>
+            </a:lnRef>
+            <a:fillRef idx="1">
+              <a:schemeClr val="accent1"/>
+            </a:fillRef>
+            <a:effectRef idx="0">
+              <a:schemeClr val="accent1"/>
+            </a:effectRef>
+            <a:fontRef idx="minor">
+              <a:schemeClr val="lt1"/>
+            </a:fontRef>
+          </p:style>
+          <p:txBody>
+            <a:bodyPr rtlCol="0" anchor="ctr"/>
+            <a:p>
+              <a:pPr algn="ctr"/>
+              <a:endParaRPr lang="en-US" sz="800"/>
+            </a:p>
+          </p:txBody>
+        </p:sp>
+        <p:sp>
+          <p:nvSpPr>
+            <p:cNvPr id="44" name="Rectangles 43"/>
+            <p:cNvSpPr/>
+            <p:nvPr/>
+          </p:nvSpPr>
+          <p:spPr>
+            <a:xfrm>
+              <a:off x="1542" y="7370"/>
+              <a:ext cx="1855" cy="226"/>
+            </a:xfrm>
+            <a:prstGeom prst="rect">
+              <a:avLst/>
+            </a:prstGeom>
+          </p:spPr>
+          <p:style>
+            <a:lnRef idx="2">
+              <a:schemeClr val="accent1">
+                <a:shade val="50000"/>
+              </a:schemeClr>
+            </a:lnRef>
+            <a:fillRef idx="1">
+              <a:schemeClr val="accent1"/>
+            </a:fillRef>
+            <a:effectRef idx="0">
+              <a:schemeClr val="accent1"/>
+            </a:effectRef>
+            <a:fontRef idx="minor">
+              <a:schemeClr val="lt1"/>
+            </a:fontRef>
+          </p:style>
+          <p:txBody>
+            <a:bodyPr rtlCol="0" anchor="ctr"/>
+            <a:p>
+              <a:pPr algn="ctr"/>
+              <a:r>
+                <a:rPr lang="en-US" sz="800">
+                  <a:sym typeface="+mn-ea"/>
+                </a:rPr>
+                <a:t>postReport()</a:t>
+              </a:r>
+              <a:endParaRPr lang="en-US" sz="800"/>
+            </a:p>
+          </p:txBody>
+        </p:sp>
+      </p:grpSp>
+      <p:sp>
+        <p:nvSpPr>
+          <p:cNvPr id="46" name="Flowchart: Terminator 45"/>
+          <p:cNvSpPr/>
+          <p:nvPr/>
+        </p:nvSpPr>
+        <p:spPr>
+          <a:xfrm>
+            <a:off x="7670165" y="824230"/>
+            <a:ext cx="480060" cy="149860"/>
+          </a:xfrm>
+          <a:prstGeom prst="flowChartTerminator">
+            <a:avLst/>
+          </a:prstGeom>
+          <a:solidFill>
+            <a:schemeClr val="accent6">
+              <a:lumMod val="40000"/>
+              <a:lumOff val="60000"/>
+            </a:schemeClr>
+          </a:solidFill>
+          <a:ln>
+            <a:solidFill>
+              <a:schemeClr val="accent6"/>
+            </a:solidFill>
+          </a:ln>
+        </p:spPr>
+        <p:style>
+          <a:lnRef idx="3">
+            <a:schemeClr val="lt1"/>
+          </a:lnRef>
+          <a:fillRef idx="1">
+            <a:schemeClr val="accent6"/>
+          </a:fillRef>
+          <a:effectRef idx="1">
+            <a:schemeClr val="accent6"/>
+          </a:effectRef>
+          <a:fontRef idx="minor">
+            <a:schemeClr val="lt1"/>
+          </a:fontRef>
+        </p:style>
+        <p:txBody>
+          <a:bodyPr rtlCol="0" anchor="ctr"/>
+          <a:p>
+            <a:pPr algn="ctr"/>
+            <a:r>
+              <a:rPr lang="en-US" sz="700">
+                <a:solidFill>
+                  <a:schemeClr val="tx1">
+                    <a:lumMod val="75000"/>
+                    <a:lumOff val="25000"/>
+                  </a:schemeClr>
+                </a:solidFill>
+              </a:rPr>
+              <a:t>next</a:t>
+            </a:r>
+            <a:endParaRPr lang="en-US" sz="700">
+              <a:solidFill>
+                <a:schemeClr val="tx1">
+                  <a:lumMod val="75000"/>
+                  <a:lumOff val="25000"/>
+                </a:schemeClr>
+              </a:solidFill>
+            </a:endParaRPr>
+          </a:p>
+        </p:txBody>
+      </p:sp>
+      <p:sp>
+        <p:nvSpPr>
+          <p:cNvPr id="56" name="Flowchart: Decision 55"/>
+          <p:cNvSpPr/>
+          <p:nvPr/>
+        </p:nvSpPr>
+        <p:spPr>
+          <a:xfrm>
+            <a:off x="2758440" y="1752304"/>
+            <a:ext cx="837565" cy="545424"/>
+          </a:xfrm>
+          <a:prstGeom prst="flowChartDecision">
+            <a:avLst/>
+          </a:prstGeom>
+        </p:spPr>
+        <p:style>
+          <a:lnRef idx="1">
+            <a:schemeClr val="accent4"/>
+          </a:lnRef>
+          <a:fillRef idx="2">
+            <a:schemeClr val="accent4"/>
+          </a:fillRef>
+          <a:effectRef idx="1">
+            <a:schemeClr val="accent4"/>
+          </a:effectRef>
+          <a:fontRef idx="minor">
+            <a:schemeClr val="dk1"/>
+          </a:fontRef>
+        </p:style>
+        <p:txBody>
+          <a:bodyPr wrap="square" lIns="0" rIns="0" rtlCol="0" anchor="ctr">
+            <a:spAutoFit/>
+          </a:bodyPr>
+          <a:p>
+            <a:pPr algn="ctr"/>
+            <a:r>
+              <a:rPr lang="en-US" sz="600"/>
+              <a:t>retrace &gt; f23.6%</a:t>
+            </a:r>
+            <a:endParaRPr lang="en-US" sz="600"/>
+          </a:p>
+        </p:txBody>
+      </p:sp>
+      <p:cxnSp>
+        <p:nvCxnSpPr>
+          <p:cNvPr id="57" name="Straight Arrow Connector 56"/>
+          <p:cNvCxnSpPr>
+            <a:stCxn id="56" idx="3"/>
+            <a:endCxn id="62" idx="1"/>
+          </p:cNvCxnSpPr>
+          <p:nvPr/>
+        </p:nvCxnSpPr>
+        <p:spPr>
+          <a:xfrm flipV="1">
+            <a:off x="3596005" y="2012950"/>
+            <a:ext cx="558165" cy="12700"/>
+          </a:xfrm>
+          <a:prstGeom prst="straightConnector1">
+            <a:avLst/>
+          </a:prstGeom>
+          <a:ln>
+            <a:tailEnd type="arrow"/>
+          </a:ln>
+        </p:spPr>
+        <p:style>
+          <a:lnRef idx="1">
+            <a:schemeClr val="accent1"/>
+          </a:lnRef>
+          <a:fillRef idx="0">
+            <a:schemeClr val="accent1"/>
+          </a:fillRef>
+          <a:effectRef idx="0">
+            <a:schemeClr val="accent1"/>
+          </a:effectRef>
+          <a:fontRef idx="minor">
+            <a:schemeClr val="tx1"/>
+          </a:fontRef>
+        </p:style>
+      </p:cxnSp>
+      <p:sp>
+        <p:nvSpPr>
+          <p:cNvPr id="58" name="Oval 57"/>
+          <p:cNvSpPr/>
+          <p:nvPr/>
+        </p:nvSpPr>
+        <p:spPr>
+          <a:xfrm>
+            <a:off x="3785870" y="1923415"/>
+            <a:ext cx="164465" cy="177165"/>
+          </a:xfrm>
+          <a:prstGeom prst="ellipse">
+            <a:avLst/>
+          </a:prstGeom>
+        </p:spPr>
+        <p:style>
+          <a:lnRef idx="1">
+            <a:schemeClr val="accent2"/>
+          </a:lnRef>
+          <a:fillRef idx="2">
+            <a:schemeClr val="accent2"/>
+          </a:fillRef>
+          <a:effectRef idx="1">
+            <a:schemeClr val="accent2"/>
+          </a:effectRef>
+          <a:fontRef idx="minor">
+            <a:schemeClr val="dk1"/>
+          </a:fontRef>
+        </p:style>
+        <p:txBody>
+          <a:bodyPr rtlCol="0" anchor="ctr"/>
+          <a:p>
+            <a:pPr algn="ctr"/>
+            <a:r>
+              <a:rPr lang="en-US" sz="700"/>
+              <a:t>y</a:t>
+            </a:r>
+            <a:endParaRPr lang="en-US" sz="700"/>
+          </a:p>
+        </p:txBody>
+      </p:sp>
+      <p:cxnSp>
+        <p:nvCxnSpPr>
+          <p:cNvPr id="59" name="Straight Arrow Connector 58"/>
+          <p:cNvCxnSpPr>
+            <a:stCxn id="41" idx="0"/>
+            <a:endCxn id="79" idx="2"/>
+          </p:cNvCxnSpPr>
+          <p:nvPr/>
+        </p:nvCxnSpPr>
+        <p:spPr>
+          <a:xfrm flipV="1">
+            <a:off x="3475355" y="3228340"/>
+            <a:ext cx="3810" cy="298450"/>
+          </a:xfrm>
+          <a:prstGeom prst="straightConnector1">
+            <a:avLst/>
+          </a:prstGeom>
+          <a:ln>
+            <a:tailEnd type="arrow"/>
+          </a:ln>
+        </p:spPr>
+        <p:style>
+          <a:lnRef idx="1">
+            <a:schemeClr val="accent1"/>
+          </a:lnRef>
+          <a:fillRef idx="0">
+            <a:schemeClr val="accent1"/>
+          </a:fillRef>
+          <a:effectRef idx="0">
+            <a:schemeClr val="accent1"/>
+          </a:effectRef>
+          <a:fontRef idx="minor">
+            <a:schemeClr val="tx1"/>
+          </a:fontRef>
+        </p:style>
+      </p:cxnSp>
+      <p:grpSp>
+        <p:nvGrpSpPr>
+          <p:cNvPr id="60" name="Group 59"/>
+          <p:cNvGrpSpPr/>
+          <p:nvPr/>
+        </p:nvGrpSpPr>
+        <p:grpSpPr>
+          <a:xfrm>
+            <a:off x="4154170" y="1776730"/>
+            <a:ext cx="1177925" cy="637540"/>
+            <a:chOff x="1542" y="6592"/>
+            <a:chExt cx="1855" cy="1004"/>
+          </a:xfrm>
+        </p:grpSpPr>
+        <p:sp>
+          <p:nvSpPr>
+            <p:cNvPr id="61" name="Rectangles 60"/>
+            <p:cNvSpPr/>
+            <p:nvPr/>
+          </p:nvSpPr>
+          <p:spPr>
+            <a:xfrm>
+              <a:off x="1542" y="6592"/>
+              <a:ext cx="1855" cy="226"/>
+            </a:xfrm>
+            <a:prstGeom prst="rect">
+              <a:avLst/>
+            </a:prstGeom>
+          </p:spPr>
+          <p:style>
+            <a:lnRef idx="2">
+              <a:schemeClr val="dk1">
+                <a:shade val="50000"/>
+              </a:schemeClr>
+            </a:lnRef>
+            <a:fillRef idx="1">
+              <a:schemeClr val="dk1"/>
+            </a:fillRef>
+            <a:effectRef idx="0">
+              <a:schemeClr val="dk1"/>
+            </a:effectRef>
+            <a:fontRef idx="minor">
+              <a:schemeClr val="lt1"/>
+            </a:fontRef>
+          </p:style>
+          <p:txBody>
+            <a:bodyPr rtlCol="0" anchor="ctr"/>
+            <a:p>
+              <a:pPr algn="ctr"/>
+              <a:r>
+                <a:rPr lang="en-US" sz="800"/>
+                <a:t>Breakout</a:t>
+              </a:r>
+              <a:endParaRPr lang="en-US" sz="800"/>
+            </a:p>
+          </p:txBody>
+        </p:sp>
+        <p:sp>
+          <p:nvSpPr>
+            <p:cNvPr id="62" name="Rectangles 61"/>
+            <p:cNvSpPr/>
+            <p:nvPr/>
+          </p:nvSpPr>
+          <p:spPr>
+            <a:xfrm>
+              <a:off x="1542" y="6851"/>
+              <a:ext cx="1855" cy="226"/>
+            </a:xfrm>
+            <a:prstGeom prst="rect">
+              <a:avLst/>
+            </a:prstGeom>
+          </p:spPr>
+          <p:style>
+            <a:lnRef idx="2">
+              <a:schemeClr val="accent1">
+                <a:shade val="50000"/>
+              </a:schemeClr>
+            </a:lnRef>
+            <a:fillRef idx="1">
+              <a:schemeClr val="accent1"/>
+            </a:fillRef>
+            <a:effectRef idx="0">
+              <a:schemeClr val="accent1"/>
+            </a:effectRef>
+            <a:fontRef idx="minor">
+              <a:schemeClr val="lt1"/>
+            </a:fontRef>
+          </p:style>
+          <p:txBody>
+            <a:bodyPr rtlCol="0" anchor="ctr"/>
+            <a:p>
+              <a:pPr algn="ctr"/>
+              <a:r>
+                <a:rPr lang="en-US" sz="800"/>
+                <a:t>setEvent()</a:t>
+              </a:r>
+              <a:endParaRPr lang="en-US" sz="800"/>
+            </a:p>
+          </p:txBody>
+        </p:sp>
+        <p:sp>
+          <p:nvSpPr>
+            <p:cNvPr id="63" name="Rectangles 62"/>
+            <p:cNvSpPr/>
+            <p:nvPr/>
+          </p:nvSpPr>
+          <p:spPr>
+            <a:xfrm>
+              <a:off x="1542" y="7111"/>
+              <a:ext cx="1855" cy="226"/>
+            </a:xfrm>
+            <a:prstGeom prst="rect">
+              <a:avLst/>
+            </a:prstGeom>
+          </p:spPr>
+          <p:style>
+            <a:lnRef idx="2">
+              <a:schemeClr val="accent1">
+                <a:shade val="50000"/>
+              </a:schemeClr>
+            </a:lnRef>
+            <a:fillRef idx="1">
+              <a:schemeClr val="accent1"/>
+            </a:fillRef>
+            <a:effectRef idx="0">
+              <a:schemeClr val="accent1"/>
+            </a:effectRef>
+            <a:fontRef idx="minor">
+              <a:schemeClr val="lt1"/>
+            </a:fontRef>
+          </p:style>
+          <p:txBody>
+            <a:bodyPr rtlCol="0" anchor="ctr"/>
+            <a:p>
+              <a:pPr algn="ctr"/>
+              <a:endParaRPr lang="en-US" sz="800"/>
+            </a:p>
+          </p:txBody>
+        </p:sp>
+        <p:sp>
+          <p:nvSpPr>
+            <p:cNvPr id="64" name="Rectangles 63"/>
+            <p:cNvSpPr/>
+            <p:nvPr/>
+          </p:nvSpPr>
+          <p:spPr>
+            <a:xfrm>
+              <a:off x="1542" y="7370"/>
+              <a:ext cx="1855" cy="226"/>
+            </a:xfrm>
+            <a:prstGeom prst="rect">
+              <a:avLst/>
+            </a:prstGeom>
+          </p:spPr>
+          <p:style>
+            <a:lnRef idx="2">
+              <a:schemeClr val="accent1">
+                <a:shade val="50000"/>
+              </a:schemeClr>
+            </a:lnRef>
+            <a:fillRef idx="1">
+              <a:schemeClr val="accent1"/>
+            </a:fillRef>
+            <a:effectRef idx="0">
+              <a:schemeClr val="accent1"/>
+            </a:effectRef>
+            <a:fontRef idx="minor">
+              <a:schemeClr val="lt1"/>
+            </a:fontRef>
+          </p:style>
+          <p:txBody>
+            <a:bodyPr rtlCol="0" anchor="ctr"/>
+            <a:p>
+              <a:pPr algn="ctr"/>
+              <a:r>
+                <a:rPr lang="en-US" sz="800">
+                  <a:sym typeface="+mn-ea"/>
+                </a:rPr>
+                <a:t>postReport()</a:t>
+              </a:r>
+              <a:endParaRPr lang="en-US" sz="800"/>
+            </a:p>
+          </p:txBody>
+        </p:sp>
+      </p:grpSp>
+      <p:cxnSp>
+        <p:nvCxnSpPr>
+          <p:cNvPr id="69" name="Straight Arrow Connector 68"/>
+          <p:cNvCxnSpPr>
+            <a:stCxn id="12" idx="2"/>
+            <a:endCxn id="70" idx="0"/>
+          </p:cNvCxnSpPr>
+          <p:nvPr/>
+        </p:nvCxnSpPr>
+        <p:spPr>
+          <a:xfrm flipH="1">
+            <a:off x="1703705" y="4028440"/>
+            <a:ext cx="5080" cy="269875"/>
+          </a:xfrm>
+          <a:prstGeom prst="straightConnector1">
+            <a:avLst/>
+          </a:prstGeom>
+          <a:ln>
+            <a:tailEnd type="arrow"/>
+          </a:ln>
+        </p:spPr>
+        <p:style>
+          <a:lnRef idx="1">
+            <a:schemeClr val="accent1"/>
+          </a:lnRef>
+          <a:fillRef idx="0">
+            <a:schemeClr val="accent1"/>
+          </a:fillRef>
+          <a:effectRef idx="0">
+            <a:schemeClr val="accent1"/>
+          </a:effectRef>
+          <a:fontRef idx="minor">
+            <a:schemeClr val="tx1"/>
+          </a:fontRef>
+        </p:style>
+      </p:cxnSp>
+      <p:sp>
+        <p:nvSpPr>
+          <p:cNvPr id="70" name="Oval 69"/>
+          <p:cNvSpPr/>
+          <p:nvPr/>
+        </p:nvSpPr>
+        <p:spPr>
+          <a:xfrm>
+            <a:off x="1621155" y="4298315"/>
+            <a:ext cx="164465" cy="177165"/>
+          </a:xfrm>
+          <a:prstGeom prst="ellipse">
+            <a:avLst/>
+          </a:prstGeom>
+        </p:spPr>
+        <p:style>
+          <a:lnRef idx="1">
+            <a:schemeClr val="accent2"/>
+          </a:lnRef>
+          <a:fillRef idx="2">
+            <a:schemeClr val="accent2"/>
+          </a:fillRef>
+          <a:effectRef idx="1">
+            <a:schemeClr val="accent2"/>
+          </a:effectRef>
+          <a:fontRef idx="minor">
+            <a:schemeClr val="dk1"/>
+          </a:fontRef>
+        </p:style>
+        <p:txBody>
+          <a:bodyPr rtlCol="0" anchor="ctr"/>
+          <a:p>
+            <a:pPr algn="ctr"/>
+            <a:r>
+              <a:rPr lang="en-US" sz="700"/>
+              <a:t>n</a:t>
+            </a:r>
+            <a:endParaRPr lang="en-US" sz="700"/>
+          </a:p>
+        </p:txBody>
+      </p:sp>
+      <p:grpSp>
+        <p:nvGrpSpPr>
+          <p:cNvPr id="71" name="Group 70"/>
+          <p:cNvGrpSpPr/>
+          <p:nvPr/>
+        </p:nvGrpSpPr>
+        <p:grpSpPr>
+          <a:xfrm>
+            <a:off x="7320915" y="1275715"/>
+            <a:ext cx="1177925" cy="637540"/>
+            <a:chOff x="1542" y="6592"/>
+            <a:chExt cx="1855" cy="1004"/>
+          </a:xfrm>
+        </p:grpSpPr>
+        <p:sp>
+          <p:nvSpPr>
+            <p:cNvPr id="73" name="Rectangles 72"/>
+            <p:cNvSpPr/>
+            <p:nvPr/>
+          </p:nvSpPr>
+          <p:spPr>
+            <a:xfrm>
+              <a:off x="1542" y="6592"/>
+              <a:ext cx="1855" cy="226"/>
+            </a:xfrm>
+            <a:prstGeom prst="rect">
+              <a:avLst/>
+            </a:prstGeom>
+          </p:spPr>
+          <p:style>
+            <a:lnRef idx="2">
+              <a:schemeClr val="dk1">
+                <a:shade val="50000"/>
+              </a:schemeClr>
+            </a:lnRef>
+            <a:fillRef idx="1">
+              <a:schemeClr val="dk1"/>
+            </a:fillRef>
+            <a:effectRef idx="0">
+              <a:schemeClr val="dk1"/>
+            </a:effectRef>
+            <a:fontRef idx="minor">
+              <a:schemeClr val="lt1"/>
+            </a:fontRef>
+          </p:style>
+          <p:txBody>
+            <a:bodyPr rtlCol="0" anchor="ctr"/>
+            <a:p>
+              <a:pPr algn="ctr"/>
+              <a:r>
+                <a:rPr lang="en-US" sz="800"/>
+                <a:t>Extension</a:t>
+              </a:r>
+              <a:endParaRPr lang="en-US" sz="800"/>
+            </a:p>
+          </p:txBody>
+        </p:sp>
+        <p:sp>
+          <p:nvSpPr>
+            <p:cNvPr id="74" name="Rectangles 73"/>
+            <p:cNvSpPr/>
+            <p:nvPr/>
+          </p:nvSpPr>
+          <p:spPr>
+            <a:xfrm>
+              <a:off x="1542" y="6851"/>
+              <a:ext cx="1855" cy="226"/>
+            </a:xfrm>
+            <a:prstGeom prst="rect">
+              <a:avLst/>
+            </a:prstGeom>
+          </p:spPr>
+          <p:style>
+            <a:lnRef idx="2">
+              <a:schemeClr val="accent1">
+                <a:shade val="50000"/>
+              </a:schemeClr>
+            </a:lnRef>
+            <a:fillRef idx="1">
+              <a:schemeClr val="accent1"/>
+            </a:fillRef>
+            <a:effectRef idx="0">
+              <a:schemeClr val="accent1"/>
+            </a:effectRef>
+            <a:fontRef idx="minor">
+              <a:schemeClr val="lt1"/>
+            </a:fontRef>
+          </p:style>
+          <p:txBody>
+            <a:bodyPr rtlCol="0" anchor="ctr"/>
+            <a:p>
+              <a:pPr algn="ctr"/>
+              <a:r>
+                <a:rPr lang="en-US" sz="800"/>
+                <a:t>setEvent()</a:t>
+              </a:r>
+              <a:endParaRPr lang="en-US" sz="800"/>
+            </a:p>
+          </p:txBody>
+        </p:sp>
+        <p:sp>
+          <p:nvSpPr>
+            <p:cNvPr id="76" name="Rectangles 75"/>
+            <p:cNvSpPr/>
+            <p:nvPr/>
+          </p:nvSpPr>
+          <p:spPr>
+            <a:xfrm>
+              <a:off x="1542" y="7111"/>
+              <a:ext cx="1855" cy="226"/>
+            </a:xfrm>
+            <a:prstGeom prst="rect">
+              <a:avLst/>
+            </a:prstGeom>
+          </p:spPr>
+          <p:style>
+            <a:lnRef idx="2">
+              <a:schemeClr val="accent1">
+                <a:shade val="50000"/>
+              </a:schemeClr>
+            </a:lnRef>
+            <a:fillRef idx="1">
+              <a:schemeClr val="accent1"/>
+            </a:fillRef>
+            <a:effectRef idx="0">
+              <a:schemeClr val="accent1"/>
+            </a:effectRef>
+            <a:fontRef idx="minor">
+              <a:schemeClr val="lt1"/>
+            </a:fontRef>
+          </p:style>
+          <p:txBody>
+            <a:bodyPr rtlCol="0" anchor="ctr"/>
+            <a:p>
+              <a:pPr algn="ctr"/>
+              <a:endParaRPr lang="en-US" sz="800"/>
+            </a:p>
+          </p:txBody>
+        </p:sp>
+        <p:sp>
+          <p:nvSpPr>
+            <p:cNvPr id="77" name="Rectangles 76"/>
+            <p:cNvSpPr/>
+            <p:nvPr/>
+          </p:nvSpPr>
+          <p:spPr>
+            <a:xfrm>
+              <a:off x="1542" y="7370"/>
+              <a:ext cx="1855" cy="226"/>
+            </a:xfrm>
+            <a:prstGeom prst="rect">
+              <a:avLst/>
+            </a:prstGeom>
+          </p:spPr>
+          <p:style>
+            <a:lnRef idx="2">
+              <a:schemeClr val="accent1">
+                <a:shade val="50000"/>
+              </a:schemeClr>
+            </a:lnRef>
+            <a:fillRef idx="1">
+              <a:schemeClr val="accent1"/>
+            </a:fillRef>
+            <a:effectRef idx="0">
+              <a:schemeClr val="accent1"/>
+            </a:effectRef>
+            <a:fontRef idx="minor">
+              <a:schemeClr val="lt1"/>
+            </a:fontRef>
+          </p:style>
+          <p:txBody>
+            <a:bodyPr rtlCol="0" anchor="ctr"/>
+            <a:p>
+              <a:pPr algn="ctr"/>
+              <a:r>
+                <a:rPr lang="en-US" sz="800">
+                  <a:sym typeface="+mn-ea"/>
+                </a:rPr>
+                <a:t>postReport()</a:t>
+              </a:r>
+              <a:endParaRPr lang="en-US" sz="800"/>
+            </a:p>
+          </p:txBody>
+        </p:sp>
+      </p:grpSp>
+      <p:cxnSp>
+        <p:nvCxnSpPr>
+          <p:cNvPr id="78" name="Elbow Connector 77"/>
+          <p:cNvCxnSpPr>
+            <a:stCxn id="62" idx="3"/>
+            <a:endCxn id="13" idx="1"/>
+          </p:cNvCxnSpPr>
+          <p:nvPr/>
+        </p:nvCxnSpPr>
+        <p:spPr>
+          <a:xfrm flipV="1">
+            <a:off x="5332095" y="1516380"/>
+            <a:ext cx="614045" cy="496570"/>
+          </a:xfrm>
+          <a:prstGeom prst="bentConnector3">
+            <a:avLst>
+              <a:gd name="adj1" fmla="val 50052"/>
+            </a:avLst>
+          </a:prstGeom>
+          <a:ln>
+            <a:tailEnd type="arrow"/>
+          </a:ln>
+        </p:spPr>
+        <p:style>
+          <a:lnRef idx="1">
+            <a:schemeClr val="accent1"/>
+          </a:lnRef>
+          <a:fillRef idx="0">
+            <a:schemeClr val="accent1"/>
+          </a:fillRef>
+          <a:effectRef idx="0">
+            <a:schemeClr val="accent1"/>
+          </a:effectRef>
+          <a:fontRef idx="minor">
+            <a:schemeClr val="tx1"/>
+          </a:fontRef>
+        </p:style>
+      </p:cxnSp>
+      <p:sp>
+        <p:nvSpPr>
+          <p:cNvPr id="79" name="Flowchart: Terminator 78"/>
+          <p:cNvSpPr/>
+          <p:nvPr/>
+        </p:nvSpPr>
+        <p:spPr>
+          <a:xfrm>
+            <a:off x="3239135" y="3078480"/>
+            <a:ext cx="480060" cy="149860"/>
+          </a:xfrm>
+          <a:prstGeom prst="flowChartTerminator">
+            <a:avLst/>
+          </a:prstGeom>
+          <a:solidFill>
+            <a:schemeClr val="accent6">
+              <a:lumMod val="40000"/>
+              <a:lumOff val="60000"/>
+            </a:schemeClr>
+          </a:solidFill>
+          <a:ln>
+            <a:solidFill>
+              <a:schemeClr val="accent6"/>
+            </a:solidFill>
+          </a:ln>
+        </p:spPr>
+        <p:style>
+          <a:lnRef idx="3">
+            <a:schemeClr val="lt1"/>
+          </a:lnRef>
+          <a:fillRef idx="1">
+            <a:schemeClr val="accent6"/>
+          </a:fillRef>
+          <a:effectRef idx="1">
+            <a:schemeClr val="accent6"/>
+          </a:effectRef>
+          <a:fontRef idx="minor">
+            <a:schemeClr val="lt1"/>
+          </a:fontRef>
+        </p:style>
+        <p:txBody>
+          <a:bodyPr rtlCol="0" anchor="ctr"/>
+          <a:p>
+            <a:pPr algn="ctr"/>
+            <a:r>
+              <a:rPr lang="en-US" sz="700">
+                <a:solidFill>
+                  <a:schemeClr val="tx1">
+                    <a:lumMod val="75000"/>
+                    <a:lumOff val="25000"/>
+                  </a:schemeClr>
+                </a:solidFill>
+              </a:rPr>
+              <a:t>next</a:t>
+            </a:r>
+            <a:endParaRPr lang="en-US" sz="700">
+              <a:solidFill>
+                <a:schemeClr val="tx1">
+                  <a:lumMod val="75000"/>
+                  <a:lumOff val="25000"/>
+                </a:schemeClr>
+              </a:solidFill>
+            </a:endParaRPr>
+          </a:p>
+        </p:txBody>
+      </p:sp>
+      <p:cxnSp>
+        <p:nvCxnSpPr>
+          <p:cNvPr id="80" name="Straight Arrow Connector 79"/>
+          <p:cNvCxnSpPr>
+            <a:stCxn id="6" idx="5"/>
+            <a:endCxn id="9" idx="1"/>
+          </p:cNvCxnSpPr>
+          <p:nvPr/>
+        </p:nvCxnSpPr>
+        <p:spPr>
+          <a:xfrm flipV="1">
+            <a:off x="1002030" y="1061085"/>
+            <a:ext cx="290830" cy="4445"/>
+          </a:xfrm>
+          <a:prstGeom prst="straightConnector1">
+            <a:avLst/>
+          </a:prstGeom>
+          <a:ln>
+            <a:tailEnd type="arrow"/>
+          </a:ln>
+        </p:spPr>
+        <p:style>
+          <a:lnRef idx="1">
+            <a:schemeClr val="accent1"/>
+          </a:lnRef>
+          <a:fillRef idx="0">
+            <a:schemeClr val="accent1"/>
+          </a:fillRef>
+          <a:effectRef idx="0">
+            <a:schemeClr val="accent1"/>
+          </a:effectRef>
+          <a:fontRef idx="minor">
+            <a:schemeClr val="tx1"/>
+          </a:fontRef>
+        </p:style>
+      </p:cxnSp>
+      <p:cxnSp>
+        <p:nvCxnSpPr>
+          <p:cNvPr id="81" name="Straight Arrow Connector 80"/>
+          <p:cNvCxnSpPr>
+            <a:stCxn id="169" idx="2"/>
+            <a:endCxn id="6" idx="1"/>
+          </p:cNvCxnSpPr>
+          <p:nvPr/>
+        </p:nvCxnSpPr>
+        <p:spPr>
+          <a:xfrm>
+            <a:off x="621030" y="609600"/>
+            <a:ext cx="635" cy="245745"/>
+          </a:xfrm>
+          <a:prstGeom prst="straightConnector1">
+            <a:avLst/>
+          </a:prstGeom>
+          <a:ln>
+            <a:tailEnd type="arrow"/>
+          </a:ln>
+        </p:spPr>
+        <p:style>
+          <a:lnRef idx="1">
+            <a:schemeClr val="accent1"/>
+          </a:lnRef>
+          <a:fillRef idx="0">
+            <a:schemeClr val="accent1"/>
+          </a:fillRef>
+          <a:effectRef idx="0">
+            <a:schemeClr val="accent1"/>
+          </a:effectRef>
+          <a:fontRef idx="minor">
+            <a:schemeClr val="tx1"/>
+          </a:fontRef>
+        </p:style>
+      </p:cxnSp>
+      <p:cxnSp>
+        <p:nvCxnSpPr>
+          <p:cNvPr id="82" name="Straight Arrow Connector 81"/>
+          <p:cNvCxnSpPr>
+            <a:stCxn id="70" idx="4"/>
+            <a:endCxn id="83" idx="0"/>
+          </p:cNvCxnSpPr>
+          <p:nvPr/>
+        </p:nvCxnSpPr>
+        <p:spPr>
+          <a:xfrm flipH="1">
+            <a:off x="1701800" y="4475480"/>
+            <a:ext cx="1905" cy="269875"/>
+          </a:xfrm>
+          <a:prstGeom prst="straightConnector1">
+            <a:avLst/>
+          </a:prstGeom>
+          <a:ln>
+            <a:tailEnd type="arrow"/>
+          </a:ln>
+        </p:spPr>
+        <p:style>
+          <a:lnRef idx="1">
+            <a:schemeClr val="accent1"/>
+          </a:lnRef>
+          <a:fillRef idx="0">
+            <a:schemeClr val="accent1"/>
+          </a:fillRef>
+          <a:effectRef idx="0">
+            <a:schemeClr val="accent1"/>
+          </a:effectRef>
+          <a:fontRef idx="minor">
+            <a:schemeClr val="tx1"/>
+          </a:fontRef>
+        </p:style>
+      </p:cxnSp>
+      <p:sp>
+        <p:nvSpPr>
+          <p:cNvPr id="83" name="Flowchart: Terminator 82"/>
+          <p:cNvSpPr/>
+          <p:nvPr/>
+        </p:nvSpPr>
+        <p:spPr>
+          <a:xfrm>
+            <a:off x="1303655" y="4745355"/>
+            <a:ext cx="796290" cy="213360"/>
+          </a:xfrm>
+          <a:prstGeom prst="flowChartTerminator">
+            <a:avLst/>
+          </a:prstGeom>
+          <a:solidFill>
+            <a:schemeClr val="accent6">
+              <a:lumMod val="40000"/>
+              <a:lumOff val="60000"/>
+            </a:schemeClr>
+          </a:solidFill>
+          <a:ln>
+            <a:solidFill>
+              <a:schemeClr val="accent6"/>
+            </a:solidFill>
+          </a:ln>
+        </p:spPr>
+        <p:style>
+          <a:lnRef idx="3">
+            <a:schemeClr val="lt1"/>
+          </a:lnRef>
+          <a:fillRef idx="1">
+            <a:schemeClr val="accent6"/>
+          </a:fillRef>
+          <a:effectRef idx="1">
+            <a:schemeClr val="accent6"/>
+          </a:effectRef>
+          <a:fontRef idx="minor">
+            <a:schemeClr val="lt1"/>
+          </a:fontRef>
+        </p:style>
+        <p:txBody>
+          <a:bodyPr rtlCol="0" anchor="ctr"/>
+          <a:p>
+            <a:pPr algn="ctr"/>
+            <a:r>
+              <a:rPr lang="en-US" sz="900">
+                <a:solidFill>
+                  <a:schemeClr val="tx1">
+                    <a:lumMod val="75000"/>
+                    <a:lumOff val="25000"/>
+                  </a:schemeClr>
+                </a:solidFill>
+              </a:rPr>
+              <a:t>End</a:t>
+            </a:r>
+            <a:endParaRPr lang="en-US" sz="900">
+              <a:solidFill>
+                <a:schemeClr val="tx1">
+                  <a:lumMod val="75000"/>
+                  <a:lumOff val="25000"/>
+                </a:schemeClr>
+              </a:solidFill>
+            </a:endParaRPr>
+          </a:p>
+        </p:txBody>
+      </p:sp>
+      <p:sp>
+        <p:nvSpPr>
+          <p:cNvPr id="84" name="Flowchart: Decision 83"/>
+          <p:cNvSpPr/>
+          <p:nvPr/>
+        </p:nvSpPr>
+        <p:spPr>
+          <a:xfrm>
+            <a:off x="2750820" y="886457"/>
+            <a:ext cx="837565" cy="367039"/>
+          </a:xfrm>
+          <a:prstGeom prst="flowChartDecision">
+            <a:avLst/>
+          </a:prstGeom>
+        </p:spPr>
+        <p:style>
+          <a:lnRef idx="1">
+            <a:schemeClr val="accent4"/>
+          </a:lnRef>
+          <a:fillRef idx="2">
+            <a:schemeClr val="accent4"/>
+          </a:fillRef>
+          <a:effectRef idx="1">
+            <a:schemeClr val="accent4"/>
+          </a:effectRef>
+          <a:fontRef idx="minor">
+            <a:schemeClr val="dk1"/>
+          </a:fontRef>
+        </p:style>
+        <p:txBody>
+          <a:bodyPr wrap="square" lIns="0" rIns="0" rtlCol="0" anchor="ctr">
+            <a:spAutoFit/>
+          </a:bodyPr>
+          <a:p>
+            <a:pPr algn="ctr"/>
+            <a:r>
+              <a:rPr lang="en-US" sz="600"/>
+              <a:t>Rreversal?</a:t>
+            </a:r>
+            <a:endParaRPr lang="en-US" sz="600"/>
+          </a:p>
+        </p:txBody>
+      </p:sp>
+      <p:cxnSp>
+        <p:nvCxnSpPr>
+          <p:cNvPr id="85" name="Straight Arrow Connector 84"/>
+          <p:cNvCxnSpPr>
+            <a:stCxn id="84" idx="2"/>
+            <a:endCxn id="56" idx="0"/>
+          </p:cNvCxnSpPr>
+          <p:nvPr/>
+        </p:nvCxnSpPr>
+        <p:spPr>
+          <a:xfrm>
+            <a:off x="3169920" y="1253490"/>
+            <a:ext cx="7620" cy="499110"/>
+          </a:xfrm>
+          <a:prstGeom prst="straightConnector1">
+            <a:avLst/>
+          </a:prstGeom>
+          <a:ln>
+            <a:tailEnd type="arrow"/>
+          </a:ln>
+        </p:spPr>
+        <p:style>
+          <a:lnRef idx="1">
+            <a:schemeClr val="accent1"/>
+          </a:lnRef>
+          <a:fillRef idx="0">
+            <a:schemeClr val="accent1"/>
+          </a:fillRef>
+          <a:effectRef idx="0">
+            <a:schemeClr val="accent1"/>
+          </a:effectRef>
+          <a:fontRef idx="minor">
+            <a:schemeClr val="tx1"/>
+          </a:fontRef>
+        </p:style>
+      </p:cxnSp>
+      <p:cxnSp>
+        <p:nvCxnSpPr>
+          <p:cNvPr id="86" name="Straight Arrow Connector 85"/>
+          <p:cNvCxnSpPr>
+            <a:stCxn id="84" idx="3"/>
+            <a:endCxn id="91" idx="1"/>
+          </p:cNvCxnSpPr>
+          <p:nvPr/>
+        </p:nvCxnSpPr>
+        <p:spPr>
+          <a:xfrm flipV="1">
+            <a:off x="3588385" y="1065530"/>
+            <a:ext cx="560705" cy="4445"/>
+          </a:xfrm>
+          <a:prstGeom prst="straightConnector1">
+            <a:avLst/>
+          </a:prstGeom>
+          <a:ln>
+            <a:tailEnd type="arrow"/>
+          </a:ln>
+        </p:spPr>
+        <p:style>
+          <a:lnRef idx="1">
+            <a:schemeClr val="accent1"/>
+          </a:lnRef>
+          <a:fillRef idx="0">
+            <a:schemeClr val="accent1"/>
+          </a:fillRef>
+          <a:effectRef idx="0">
+            <a:schemeClr val="accent1"/>
+          </a:effectRef>
+          <a:fontRef idx="minor">
+            <a:schemeClr val="tx1"/>
+          </a:fontRef>
+        </p:style>
+      </p:cxnSp>
+      <p:sp>
+        <p:nvSpPr>
+          <p:cNvPr id="87" name="Oval 86"/>
+          <p:cNvSpPr/>
+          <p:nvPr/>
+        </p:nvSpPr>
+        <p:spPr>
+          <a:xfrm>
+            <a:off x="3766820" y="981710"/>
+            <a:ext cx="164465" cy="177165"/>
+          </a:xfrm>
+          <a:prstGeom prst="ellipse">
+            <a:avLst/>
+          </a:prstGeom>
+        </p:spPr>
+        <p:style>
+          <a:lnRef idx="1">
+            <a:schemeClr val="accent2"/>
+          </a:lnRef>
+          <a:fillRef idx="2">
+            <a:schemeClr val="accent2"/>
+          </a:fillRef>
+          <a:effectRef idx="1">
+            <a:schemeClr val="accent2"/>
+          </a:effectRef>
+          <a:fontRef idx="minor">
+            <a:schemeClr val="dk1"/>
+          </a:fontRef>
+        </p:style>
+        <p:txBody>
+          <a:bodyPr rtlCol="0" anchor="ctr"/>
+          <a:p>
+            <a:pPr algn="ctr"/>
+            <a:r>
+              <a:rPr lang="en-US" sz="700"/>
+              <a:t>y</a:t>
+            </a:r>
+            <a:endParaRPr lang="en-US" sz="700"/>
+          </a:p>
+        </p:txBody>
+      </p:sp>
+      <p:sp>
+        <p:nvSpPr>
+          <p:cNvPr id="88" name="Oval 87"/>
+          <p:cNvSpPr/>
+          <p:nvPr/>
+        </p:nvSpPr>
+        <p:spPr>
+          <a:xfrm>
+            <a:off x="3087370" y="1356360"/>
+            <a:ext cx="164465" cy="177165"/>
+          </a:xfrm>
+          <a:prstGeom prst="ellipse">
+            <a:avLst/>
+          </a:prstGeom>
+        </p:spPr>
+        <p:style>
+          <a:lnRef idx="1">
+            <a:schemeClr val="accent2"/>
+          </a:lnRef>
+          <a:fillRef idx="2">
+            <a:schemeClr val="accent2"/>
+          </a:fillRef>
+          <a:effectRef idx="1">
+            <a:schemeClr val="accent2"/>
+          </a:effectRef>
+          <a:fontRef idx="minor">
+            <a:schemeClr val="dk1"/>
+          </a:fontRef>
+        </p:style>
+        <p:txBody>
+          <a:bodyPr rtlCol="0" anchor="ctr"/>
+          <a:p>
+            <a:pPr algn="ctr"/>
+            <a:r>
+              <a:rPr lang="en-US" sz="700"/>
+              <a:t>n</a:t>
+            </a:r>
+            <a:endParaRPr lang="en-US" sz="700"/>
+          </a:p>
+        </p:txBody>
+      </p:sp>
+      <p:cxnSp>
+        <p:nvCxnSpPr>
+          <p:cNvPr id="89" name="Straight Arrow Connector 88"/>
+          <p:cNvCxnSpPr>
+            <a:stCxn id="73" idx="0"/>
+            <a:endCxn id="46" idx="2"/>
+          </p:cNvCxnSpPr>
+          <p:nvPr/>
+        </p:nvCxnSpPr>
+        <p:spPr>
+          <a:xfrm flipV="1">
+            <a:off x="7910195" y="974090"/>
+            <a:ext cx="0" cy="301625"/>
+          </a:xfrm>
+          <a:prstGeom prst="straightConnector1">
+            <a:avLst/>
+          </a:prstGeom>
+          <a:ln>
+            <a:tailEnd type="arrow"/>
+          </a:ln>
+        </p:spPr>
+        <p:style>
+          <a:lnRef idx="1">
+            <a:schemeClr val="accent1"/>
+          </a:lnRef>
+          <a:fillRef idx="0">
+            <a:schemeClr val="accent1"/>
+          </a:fillRef>
+          <a:effectRef idx="0">
+            <a:schemeClr val="accent1"/>
+          </a:effectRef>
+          <a:fontRef idx="minor">
+            <a:schemeClr val="tx1"/>
+          </a:fontRef>
+        </p:style>
+      </p:cxnSp>
+      <p:cxnSp>
+        <p:nvCxnSpPr>
+          <p:cNvPr id="94" name="Elbow Connector 93"/>
+          <p:cNvCxnSpPr>
+            <a:stCxn id="46" idx="1"/>
+            <a:endCxn id="13" idx="0"/>
+          </p:cNvCxnSpPr>
+          <p:nvPr/>
+        </p:nvCxnSpPr>
+        <p:spPr>
+          <a:xfrm rot="10800000" flipV="1">
+            <a:off x="6364605" y="898525"/>
+            <a:ext cx="1304925" cy="342265"/>
+          </a:xfrm>
+          <a:prstGeom prst="bentConnector2">
+            <a:avLst/>
+          </a:prstGeom>
+          <a:ln>
+            <a:tailEnd type="arrow"/>
+          </a:ln>
+        </p:spPr>
+        <p:style>
+          <a:lnRef idx="1">
+            <a:schemeClr val="accent1"/>
+          </a:lnRef>
+          <a:fillRef idx="0">
+            <a:schemeClr val="accent1"/>
+          </a:fillRef>
+          <a:effectRef idx="0">
+            <a:schemeClr val="accent1"/>
+          </a:effectRef>
+          <a:fontRef idx="minor">
+            <a:schemeClr val="tx1"/>
+          </a:fontRef>
+        </p:style>
+      </p:cxnSp>
+      <p:cxnSp>
+        <p:nvCxnSpPr>
+          <p:cNvPr id="95" name="Elbow Connector 94"/>
+          <p:cNvCxnSpPr>
+            <a:stCxn id="56" idx="2"/>
+            <a:endCxn id="96" idx="6"/>
+          </p:cNvCxnSpPr>
+          <p:nvPr/>
+        </p:nvCxnSpPr>
+        <p:spPr>
+          <a:xfrm rot="5400000">
+            <a:off x="2311718" y="1838643"/>
+            <a:ext cx="406400" cy="1325245"/>
+          </a:xfrm>
+          <a:prstGeom prst="bentConnector2">
+            <a:avLst/>
+          </a:prstGeom>
+          <a:ln>
+            <a:tailEnd type="arrow"/>
+          </a:ln>
+        </p:spPr>
+        <p:style>
+          <a:lnRef idx="1">
+            <a:schemeClr val="accent1"/>
+          </a:lnRef>
+          <a:fillRef idx="0">
+            <a:schemeClr val="accent1"/>
+          </a:fillRef>
+          <a:effectRef idx="0">
+            <a:schemeClr val="accent1"/>
+          </a:effectRef>
+          <a:fontRef idx="minor">
+            <a:schemeClr val="tx1"/>
+          </a:fontRef>
+        </p:style>
+      </p:cxnSp>
+      <p:sp>
+        <p:nvSpPr>
+          <p:cNvPr id="96" name="Oval 95"/>
+          <p:cNvSpPr/>
+          <p:nvPr/>
+        </p:nvSpPr>
+        <p:spPr>
+          <a:xfrm>
+            <a:off x="1551305" y="2545080"/>
+            <a:ext cx="300990" cy="318770"/>
+          </a:xfrm>
+          <a:prstGeom prst="ellipse">
+            <a:avLst/>
+          </a:prstGeom>
+          <a:solidFill>
+            <a:schemeClr val="accent1">
+              <a:lumMod val="60000"/>
+              <a:lumOff val="40000"/>
+            </a:schemeClr>
+          </a:solidFill>
+        </p:spPr>
+        <p:style>
+          <a:lnRef idx="2">
+            <a:schemeClr val="accent1">
+              <a:shade val="50000"/>
+            </a:schemeClr>
+          </a:lnRef>
+          <a:fillRef idx="1">
+            <a:schemeClr val="accent1"/>
+          </a:fillRef>
+          <a:effectRef idx="0">
+            <a:schemeClr val="accent1"/>
+          </a:effectRef>
+          <a:fontRef idx="minor">
+            <a:schemeClr val="lt1"/>
+          </a:fontRef>
+        </p:style>
+        <p:txBody>
+          <a:bodyPr rtlCol="0" anchor="ctr"/>
+          <a:p>
+            <a:pPr algn="ctr"/>
+            <a:r>
+              <a:rPr lang="en-US" sz="1200"/>
+              <a:t>A</a:t>
+            </a:r>
+            <a:endParaRPr lang="en-US" sz="1200"/>
+          </a:p>
+        </p:txBody>
+      </p:sp>
+      <p:cxnSp>
+        <p:nvCxnSpPr>
+          <p:cNvPr id="97" name="Elbow Connector 96"/>
+          <p:cNvCxnSpPr>
+            <a:stCxn id="13" idx="2"/>
+            <a:endCxn id="66" idx="6"/>
+          </p:cNvCxnSpPr>
+          <p:nvPr/>
+        </p:nvCxnSpPr>
+        <p:spPr>
+          <a:xfrm rot="5400000">
+            <a:off x="4355465" y="694690"/>
+            <a:ext cx="913765" cy="3105785"/>
+          </a:xfrm>
+          <a:prstGeom prst="bentConnector2">
+            <a:avLst/>
+          </a:prstGeom>
+          <a:ln>
+            <a:tailEnd type="arrow"/>
+          </a:ln>
+        </p:spPr>
+        <p:style>
+          <a:lnRef idx="1">
+            <a:schemeClr val="accent1"/>
+          </a:lnRef>
+          <a:fillRef idx="0">
+            <a:schemeClr val="accent1"/>
+          </a:fillRef>
+          <a:effectRef idx="0">
+            <a:schemeClr val="accent1"/>
+          </a:effectRef>
+          <a:fontRef idx="minor">
+            <a:schemeClr val="tx1"/>
+          </a:fontRef>
+        </p:style>
+      </p:cxnSp>
+      <p:sp>
+        <p:nvSpPr>
+          <p:cNvPr id="66" name="Oval 65"/>
+          <p:cNvSpPr/>
+          <p:nvPr/>
+        </p:nvSpPr>
+        <p:spPr>
+          <a:xfrm>
+            <a:off x="3094990" y="2616200"/>
+            <a:ext cx="164465" cy="177165"/>
+          </a:xfrm>
+          <a:prstGeom prst="ellipse">
+            <a:avLst/>
+          </a:prstGeom>
+        </p:spPr>
+        <p:style>
+          <a:lnRef idx="1">
+            <a:schemeClr val="accent2"/>
+          </a:lnRef>
+          <a:fillRef idx="2">
+            <a:schemeClr val="accent2"/>
+          </a:fillRef>
+          <a:effectRef idx="1">
+            <a:schemeClr val="accent2"/>
+          </a:effectRef>
+          <a:fontRef idx="minor">
+            <a:schemeClr val="dk1"/>
+          </a:fontRef>
+        </p:style>
+        <p:txBody>
+          <a:bodyPr rtlCol="0" anchor="ctr"/>
+          <a:p>
+            <a:pPr algn="ctr"/>
+            <a:r>
+              <a:rPr lang="en-US" sz="700"/>
+              <a:t>n</a:t>
+            </a:r>
+            <a:endParaRPr lang="en-US" sz="700"/>
+          </a:p>
+        </p:txBody>
+      </p:sp>
+      <p:pic>
+        <p:nvPicPr>
+          <p:cNvPr id="98" name="Picture 97"/>
+          <p:cNvPicPr>
+            <a:picLocks noChangeAspect="1"/>
+          </p:cNvPicPr>
+          <p:nvPr/>
+        </p:nvPicPr>
+        <p:blipFill>
+          <a:blip r:embed="rId1"/>
+          <a:stretch>
+            <a:fillRect/>
+          </a:stretch>
+        </p:blipFill>
+        <p:spPr>
+          <a:xfrm>
+            <a:off x="7373620" y="2106295"/>
+            <a:ext cx="4237990" cy="4474845"/>
+          </a:xfrm>
+          <a:prstGeom prst="rect">
+            <a:avLst/>
+          </a:prstGeom>
+        </p:spPr>
+      </p:pic>
+      <p:sp>
+        <p:nvSpPr>
+          <p:cNvPr id="279" name="Text Box 278"/>
+          <p:cNvSpPr txBox="1"/>
+          <p:nvPr/>
+        </p:nvSpPr>
+        <p:spPr>
+          <a:xfrm>
+            <a:off x="10534015" y="191770"/>
+            <a:ext cx="1379855" cy="398780"/>
+          </a:xfrm>
+          <a:prstGeom prst="rect">
+            <a:avLst/>
+          </a:prstGeom>
+        </p:spPr>
+        <p:style>
+          <a:lnRef idx="1">
+            <a:schemeClr val="accent5"/>
+          </a:lnRef>
+          <a:fillRef idx="2">
+            <a:schemeClr val="accent5"/>
+          </a:fillRef>
+          <a:effectRef idx="1">
+            <a:schemeClr val="accent5"/>
+          </a:effectRef>
+          <a:fontRef idx="minor">
+            <a:schemeClr val="dk1"/>
+          </a:fontRef>
+        </p:style>
+        <p:txBody>
+          <a:bodyPr wrap="square" rtlCol="0">
+            <a:spAutoFit/>
+          </a:bodyPr>
+          <a:p>
+            <a:r>
+              <a:rPr lang="en-US" sz="1000"/>
+              <a:t>Fibonacci Flow</a:t>
+            </a:r>
+            <a:endParaRPr lang="en-US" sz="1000"/>
+          </a:p>
+          <a:p>
+            <a:r>
+              <a:rPr lang="en-US" sz="1000"/>
+              <a:t>04/15/2025</a:t>
+            </a:r>
+            <a:endParaRPr lang="en-US" sz="1000"/>
+          </a:p>
+        </p:txBody>
+      </p:sp>
     </p:spTree>
   </p:cSld>
   <p:clrMapOvr>

</xml_diff>

<commit_message>
Document updates; revised Fibo analytics worksheet and Fibo flow ppt;
</commit_message>
<xml_diff>
--- a/~Documents/FractalFlow.pptx
+++ b/~Documents/FractalFlow.pptx
@@ -10832,14 +10832,14 @@
           <p:cNvPr id="50" name="Straight Arrow Connector 49"/>
           <p:cNvCxnSpPr>
             <a:stCxn id="9" idx="2"/>
-            <a:endCxn id="12" idx="0"/>
+            <a:endCxn id="96" idx="0"/>
           </p:cNvCxnSpPr>
           <p:nvPr/>
         </p:nvCxnSpPr>
         <p:spPr>
           <a:xfrm flipH="1">
-            <a:off x="1708785" y="1244600"/>
-            <a:ext cx="3175" cy="2244090"/>
+            <a:off x="1701800" y="1244600"/>
+            <a:ext cx="10160" cy="1300480"/>
           </a:xfrm>
           <a:prstGeom prst="straightConnector1">
             <a:avLst/>
@@ -11027,7 +11027,7 @@
         </p:nvCxnSpPr>
         <p:spPr>
           <a:xfrm flipH="1">
-            <a:off x="1790065" y="3153410"/>
+            <a:off x="1790065" y="3483610"/>
             <a:ext cx="1449070" cy="1270"/>
           </a:xfrm>
           <a:prstGeom prst="straightConnector1">
@@ -11060,7 +11060,7 @@
         </p:nvSpPr>
         <p:spPr>
           <a:xfrm>
-            <a:off x="1625600" y="3065780"/>
+            <a:off x="1625600" y="3395980"/>
             <a:ext cx="164465" cy="177165"/>
           </a:xfrm>
           <a:prstGeom prst="ellipse">
@@ -11105,7 +11105,7 @@
         <p:spPr>
           <a:xfrm>
             <a:off x="2130425" y="1061085"/>
-            <a:ext cx="620395" cy="8890"/>
+            <a:ext cx="2032000" cy="8890"/>
           </a:xfrm>
           <a:prstGeom prst="straightConnector1">
             <a:avLst/>
@@ -11137,7 +11137,7 @@
         </p:nvSpPr>
         <p:spPr>
           <a:xfrm>
-            <a:off x="2311400" y="975995"/>
+            <a:off x="3186430" y="975995"/>
             <a:ext cx="164465" cy="177165"/>
           </a:xfrm>
           <a:prstGeom prst="ellipse">
@@ -11178,7 +11178,7 @@
         </p:nvSpPr>
         <p:spPr>
           <a:xfrm>
-            <a:off x="1289685" y="3488731"/>
+            <a:off x="1289685" y="3818931"/>
             <a:ext cx="837565" cy="539669"/>
           </a:xfrm>
           <a:prstGeom prst="flowChartDecision">
@@ -11221,7 +11221,7 @@
         </p:nvSpPr>
         <p:spPr>
           <a:xfrm>
-            <a:off x="5946140" y="1241514"/>
+            <a:off x="7357745" y="1241514"/>
             <a:ext cx="837565" cy="549734"/>
           </a:xfrm>
           <a:prstGeom prst="flowChartDecision">
@@ -11266,7 +11266,7 @@
         </p:nvCxnSpPr>
         <p:spPr>
           <a:xfrm flipV="1">
-            <a:off x="6783705" y="1511935"/>
+            <a:off x="8195310" y="1511935"/>
             <a:ext cx="537210" cy="4445"/>
           </a:xfrm>
           <a:prstGeom prst="straightConnector1">
@@ -11299,7 +11299,7 @@
         </p:nvSpPr>
         <p:spPr>
           <a:xfrm>
-            <a:off x="6968490" y="1430020"/>
+            <a:off x="8380095" y="1430020"/>
             <a:ext cx="164465" cy="177165"/>
           </a:xfrm>
           <a:prstGeom prst="ellipse">
@@ -11343,7 +11343,7 @@
         </p:nvCxnSpPr>
         <p:spPr>
           <a:xfrm>
-            <a:off x="5327015" y="1065530"/>
+            <a:off x="6738620" y="1065530"/>
             <a:ext cx="619125" cy="450850"/>
           </a:xfrm>
           <a:prstGeom prst="bentConnector3">
@@ -11378,10 +11378,10 @@
         </p:nvGrpSpPr>
         <p:grpSpPr>
           <a:xfrm>
-            <a:off x="4149090" y="829310"/>
-            <a:ext cx="1177925" cy="637540"/>
+            <a:off x="5560695" y="829310"/>
+            <a:ext cx="1177925" cy="525780"/>
             <a:chOff x="1542" y="6592"/>
-            <a:chExt cx="1855" cy="1004"/>
+            <a:chExt cx="1855" cy="828"/>
           </a:xfrm>
         </p:grpSpPr>
         <p:sp>
@@ -11472,53 +11472,14 @@
         </p:sp>
         <p:sp>
           <p:nvSpPr>
-            <p:cNvPr id="92" name="Rectangles 91"/>
-            <p:cNvSpPr/>
-            <p:nvPr/>
-          </p:nvSpPr>
-          <p:spPr>
-            <a:xfrm>
-              <a:off x="1542" y="7111"/>
-              <a:ext cx="1855" cy="226"/>
-            </a:xfrm>
-            <a:prstGeom prst="rect">
-              <a:avLst/>
-            </a:prstGeom>
-          </p:spPr>
-          <p:style>
-            <a:lnRef idx="2">
-              <a:schemeClr val="accent1">
-                <a:shade val="50000"/>
-              </a:schemeClr>
-            </a:lnRef>
-            <a:fillRef idx="1">
-              <a:schemeClr val="accent1"/>
-            </a:fillRef>
-            <a:effectRef idx="0">
-              <a:schemeClr val="accent1"/>
-            </a:effectRef>
-            <a:fontRef idx="minor">
-              <a:schemeClr val="lt1"/>
-            </a:fontRef>
-          </p:style>
-          <p:txBody>
-            <a:bodyPr rtlCol="0" anchor="ctr"/>
-            <a:p>
-              <a:pPr algn="ctr"/>
-              <a:endParaRPr lang="en-US" sz="800"/>
-            </a:p>
-          </p:txBody>
-        </p:sp>
-        <p:sp>
-          <p:nvSpPr>
             <p:cNvPr id="93" name="Rectangles 92"/>
             <p:cNvSpPr/>
             <p:nvPr/>
           </p:nvSpPr>
           <p:spPr>
             <a:xfrm>
-              <a:off x="1542" y="7370"/>
-              <a:ext cx="1855" cy="226"/>
+              <a:off x="1542" y="7123"/>
+              <a:ext cx="1855" cy="297"/>
             </a:xfrm>
             <a:prstGeom prst="rect">
               <a:avLst/>
@@ -11566,7 +11527,7 @@
         </p:nvCxnSpPr>
         <p:spPr>
           <a:xfrm>
-            <a:off x="2127250" y="3758565"/>
+            <a:off x="2127250" y="4088765"/>
             <a:ext cx="758825" cy="4445"/>
           </a:xfrm>
           <a:prstGeom prst="straightConnector1">
@@ -11599,7 +11560,7 @@
         </p:nvSpPr>
         <p:spPr>
           <a:xfrm>
-            <a:off x="2347595" y="3670300"/>
+            <a:off x="2347595" y="4000500"/>
             <a:ext cx="164465" cy="177165"/>
           </a:xfrm>
           <a:prstGeom prst="ellipse">
@@ -11640,10 +11601,10 @@
         </p:nvGrpSpPr>
         <p:grpSpPr>
           <a:xfrm>
-            <a:off x="2886075" y="3526790"/>
-            <a:ext cx="1177925" cy="637540"/>
+            <a:off x="2886075" y="3856990"/>
+            <a:ext cx="1177925" cy="472440"/>
             <a:chOff x="1542" y="6592"/>
-            <a:chExt cx="1855" cy="1004"/>
+            <a:chExt cx="1855" cy="744"/>
           </a:xfrm>
         </p:grpSpPr>
         <p:sp>
@@ -11734,52 +11695,13 @@
         </p:sp>
         <p:sp>
           <p:nvSpPr>
-            <p:cNvPr id="43" name="Rectangles 42"/>
-            <p:cNvSpPr/>
-            <p:nvPr/>
-          </p:nvSpPr>
-          <p:spPr>
-            <a:xfrm>
-              <a:off x="1542" y="7111"/>
-              <a:ext cx="1855" cy="226"/>
-            </a:xfrm>
-            <a:prstGeom prst="rect">
-              <a:avLst/>
-            </a:prstGeom>
-          </p:spPr>
-          <p:style>
-            <a:lnRef idx="2">
-              <a:schemeClr val="accent1">
-                <a:shade val="50000"/>
-              </a:schemeClr>
-            </a:lnRef>
-            <a:fillRef idx="1">
-              <a:schemeClr val="accent1"/>
-            </a:fillRef>
-            <a:effectRef idx="0">
-              <a:schemeClr val="accent1"/>
-            </a:effectRef>
-            <a:fontRef idx="minor">
-              <a:schemeClr val="lt1"/>
-            </a:fontRef>
-          </p:style>
-          <p:txBody>
-            <a:bodyPr rtlCol="0" anchor="ctr"/>
-            <a:p>
-              <a:pPr algn="ctr"/>
-              <a:endParaRPr lang="en-US" sz="800"/>
-            </a:p>
-          </p:txBody>
-        </p:sp>
-        <p:sp>
-          <p:nvSpPr>
             <p:cNvPr id="44" name="Rectangles 43"/>
             <p:cNvSpPr/>
             <p:nvPr/>
           </p:nvSpPr>
           <p:spPr>
             <a:xfrm>
-              <a:off x="1542" y="7370"/>
+              <a:off x="1542" y="7110"/>
               <a:ext cx="1855" cy="226"/>
             </a:xfrm>
             <a:prstGeom prst="rect">
@@ -11825,7 +11747,7 @@
         </p:nvSpPr>
         <p:spPr>
           <a:xfrm>
-            <a:off x="7670165" y="824230"/>
+            <a:off x="9081770" y="824230"/>
             <a:ext cx="480060" cy="149860"/>
           </a:xfrm>
           <a:prstGeom prst="flowChartTerminator">
@@ -11891,7 +11813,7 @@
         </p:nvSpPr>
         <p:spPr>
           <a:xfrm>
-            <a:off x="2758440" y="1752304"/>
+            <a:off x="4170045" y="1752304"/>
             <a:ext cx="837565" cy="545424"/>
           </a:xfrm>
           <a:prstGeom prst="flowChartDecision">
@@ -11937,8 +11859,8 @@
         </p:nvCxnSpPr>
         <p:spPr>
           <a:xfrm flipV="1">
-            <a:off x="3596005" y="2012950"/>
-            <a:ext cx="558165" cy="12700"/>
+            <a:off x="5007610" y="2007235"/>
+            <a:ext cx="553085" cy="18415"/>
           </a:xfrm>
           <a:prstGeom prst="straightConnector1">
             <a:avLst/>
@@ -11970,7 +11892,7 @@
         </p:nvSpPr>
         <p:spPr>
           <a:xfrm>
-            <a:off x="3785870" y="1923415"/>
+            <a:off x="5197475" y="1923415"/>
             <a:ext cx="164465" cy="177165"/>
           </a:xfrm>
           <a:prstGeom prst="ellipse">
@@ -12014,7 +11936,7 @@
         </p:nvCxnSpPr>
         <p:spPr>
           <a:xfrm flipV="1">
-            <a:off x="3475355" y="3228340"/>
+            <a:off x="3475355" y="3558540"/>
             <a:ext cx="3810" cy="298450"/>
           </a:xfrm>
           <a:prstGeom prst="straightConnector1">
@@ -12047,10 +11969,10 @@
         </p:nvGrpSpPr>
         <p:grpSpPr>
           <a:xfrm>
-            <a:off x="4154170" y="1776730"/>
-            <a:ext cx="1177925" cy="637540"/>
+            <a:off x="5560695" y="1771015"/>
+            <a:ext cx="1177925" cy="521970"/>
             <a:chOff x="1542" y="6592"/>
-            <a:chExt cx="1855" cy="1004"/>
+            <a:chExt cx="1855" cy="822"/>
           </a:xfrm>
         </p:grpSpPr>
         <p:sp>
@@ -12141,53 +12063,14 @@
         </p:sp>
         <p:sp>
           <p:nvSpPr>
-            <p:cNvPr id="63" name="Rectangles 62"/>
-            <p:cNvSpPr/>
-            <p:nvPr/>
-          </p:nvSpPr>
-          <p:spPr>
-            <a:xfrm>
-              <a:off x="1542" y="7111"/>
-              <a:ext cx="1855" cy="226"/>
-            </a:xfrm>
-            <a:prstGeom prst="rect">
-              <a:avLst/>
-            </a:prstGeom>
-          </p:spPr>
-          <p:style>
-            <a:lnRef idx="2">
-              <a:schemeClr val="accent1">
-                <a:shade val="50000"/>
-              </a:schemeClr>
-            </a:lnRef>
-            <a:fillRef idx="1">
-              <a:schemeClr val="accent1"/>
-            </a:fillRef>
-            <a:effectRef idx="0">
-              <a:schemeClr val="accent1"/>
-            </a:effectRef>
-            <a:fontRef idx="minor">
-              <a:schemeClr val="lt1"/>
-            </a:fontRef>
-          </p:style>
-          <p:txBody>
-            <a:bodyPr rtlCol="0" anchor="ctr"/>
-            <a:p>
-              <a:pPr algn="ctr"/>
-              <a:endParaRPr lang="en-US" sz="800"/>
-            </a:p>
-          </p:txBody>
-        </p:sp>
-        <p:sp>
-          <p:nvSpPr>
             <p:cNvPr id="64" name="Rectangles 63"/>
             <p:cNvSpPr/>
             <p:nvPr/>
           </p:nvSpPr>
           <p:spPr>
             <a:xfrm>
-              <a:off x="1542" y="7370"/>
-              <a:ext cx="1855" cy="226"/>
+              <a:off x="1542" y="7121"/>
+              <a:ext cx="1855" cy="293"/>
             </a:xfrm>
             <a:prstGeom prst="rect">
               <a:avLst/>
@@ -12235,7 +12118,7 @@
         </p:nvCxnSpPr>
         <p:spPr>
           <a:xfrm flipH="1">
-            <a:off x="1703705" y="4028440"/>
+            <a:off x="1703705" y="4358640"/>
             <a:ext cx="5080" cy="269875"/>
           </a:xfrm>
           <a:prstGeom prst="straightConnector1">
@@ -12268,7 +12151,7 @@
         </p:nvSpPr>
         <p:spPr>
           <a:xfrm>
-            <a:off x="1621155" y="4298315"/>
+            <a:off x="1621155" y="4628515"/>
             <a:ext cx="164465" cy="177165"/>
           </a:xfrm>
           <a:prstGeom prst="ellipse">
@@ -12309,10 +12192,10 @@
         </p:nvGrpSpPr>
         <p:grpSpPr>
           <a:xfrm>
-            <a:off x="7320915" y="1275715"/>
-            <a:ext cx="1177925" cy="637540"/>
+            <a:off x="8732520" y="1259205"/>
+            <a:ext cx="1177925" cy="546735"/>
             <a:chOff x="1542" y="6592"/>
-            <a:chExt cx="1855" cy="1004"/>
+            <a:chExt cx="1855" cy="861"/>
           </a:xfrm>
         </p:grpSpPr>
         <p:sp>
@@ -12403,53 +12286,14 @@
         </p:sp>
         <p:sp>
           <p:nvSpPr>
-            <p:cNvPr id="76" name="Rectangles 75"/>
-            <p:cNvSpPr/>
-            <p:nvPr/>
-          </p:nvSpPr>
-          <p:spPr>
-            <a:xfrm>
-              <a:off x="1542" y="7111"/>
-              <a:ext cx="1855" cy="226"/>
-            </a:xfrm>
-            <a:prstGeom prst="rect">
-              <a:avLst/>
-            </a:prstGeom>
-          </p:spPr>
-          <p:style>
-            <a:lnRef idx="2">
-              <a:schemeClr val="accent1">
-                <a:shade val="50000"/>
-              </a:schemeClr>
-            </a:lnRef>
-            <a:fillRef idx="1">
-              <a:schemeClr val="accent1"/>
-            </a:fillRef>
-            <a:effectRef idx="0">
-              <a:schemeClr val="accent1"/>
-            </a:effectRef>
-            <a:fontRef idx="minor">
-              <a:schemeClr val="lt1"/>
-            </a:fontRef>
-          </p:style>
-          <p:txBody>
-            <a:bodyPr rtlCol="0" anchor="ctr"/>
-            <a:p>
-              <a:pPr algn="ctr"/>
-              <a:endParaRPr lang="en-US" sz="800"/>
-            </a:p>
-          </p:txBody>
-        </p:sp>
-        <p:sp>
-          <p:nvSpPr>
             <p:cNvPr id="77" name="Rectangles 76"/>
             <p:cNvSpPr/>
             <p:nvPr/>
           </p:nvSpPr>
           <p:spPr>
             <a:xfrm>
-              <a:off x="1542" y="7370"/>
-              <a:ext cx="1855" cy="226"/>
+              <a:off x="1542" y="7120"/>
+              <a:ext cx="1855" cy="333"/>
             </a:xfrm>
             <a:prstGeom prst="rect">
               <a:avLst/>
@@ -12497,12 +12341,12 @@
         </p:nvCxnSpPr>
         <p:spPr>
           <a:xfrm flipV="1">
-            <a:off x="5332095" y="1516380"/>
-            <a:ext cx="614045" cy="496570"/>
+            <a:off x="6738620" y="1516380"/>
+            <a:ext cx="619125" cy="490855"/>
           </a:xfrm>
           <a:prstGeom prst="bentConnector3">
             <a:avLst>
-              <a:gd name="adj1" fmla="val 50052"/>
+              <a:gd name="adj1" fmla="val 50051"/>
             </a:avLst>
           </a:prstGeom>
           <a:ln>
@@ -12532,7 +12376,7 @@
         </p:nvSpPr>
         <p:spPr>
           <a:xfrm>
-            <a:off x="3239135" y="3078480"/>
+            <a:off x="3239135" y="3408680"/>
             <a:ext cx="480060" cy="149860"/>
           </a:xfrm>
           <a:prstGeom prst="flowChartTerminator">
@@ -12673,7 +12517,7 @@
         </p:nvCxnSpPr>
         <p:spPr>
           <a:xfrm flipH="1">
-            <a:off x="1701800" y="4475480"/>
+            <a:off x="1701800" y="4805680"/>
             <a:ext cx="1905" cy="269875"/>
           </a:xfrm>
           <a:prstGeom prst="straightConnector1">
@@ -12706,7 +12550,7 @@
         </p:nvSpPr>
         <p:spPr>
           <a:xfrm>
-            <a:off x="1303655" y="4745355"/>
+            <a:off x="1303655" y="5075555"/>
             <a:ext cx="796290" cy="213360"/>
           </a:xfrm>
           <a:prstGeom prst="flowChartTerminator">
@@ -12772,7 +12616,7 @@
         </p:nvSpPr>
         <p:spPr>
           <a:xfrm>
-            <a:off x="2750820" y="886457"/>
+            <a:off x="4162425" y="886457"/>
             <a:ext cx="837565" cy="367039"/>
           </a:xfrm>
           <a:prstGeom prst="flowChartDecision">
@@ -12818,7 +12662,7 @@
         </p:nvCxnSpPr>
         <p:spPr>
           <a:xfrm>
-            <a:off x="3169920" y="1253490"/>
+            <a:off x="4581525" y="1253490"/>
             <a:ext cx="7620" cy="499110"/>
           </a:xfrm>
           <a:prstGeom prst="straightConnector1">
@@ -12854,7 +12698,7 @@
         </p:nvCxnSpPr>
         <p:spPr>
           <a:xfrm flipV="1">
-            <a:off x="3588385" y="1065530"/>
+            <a:off x="4999990" y="1065530"/>
             <a:ext cx="560705" cy="4445"/>
           </a:xfrm>
           <a:prstGeom prst="straightConnector1">
@@ -12887,7 +12731,7 @@
         </p:nvSpPr>
         <p:spPr>
           <a:xfrm>
-            <a:off x="3766820" y="981710"/>
+            <a:off x="5178425" y="981710"/>
             <a:ext cx="164465" cy="177165"/>
           </a:xfrm>
           <a:prstGeom prst="ellipse">
@@ -12928,7 +12772,7 @@
         </p:nvSpPr>
         <p:spPr>
           <a:xfrm>
-            <a:off x="3087370" y="1356360"/>
+            <a:off x="4498975" y="1356360"/>
             <a:ext cx="164465" cy="177165"/>
           </a:xfrm>
           <a:prstGeom prst="ellipse">
@@ -12972,8 +12816,8 @@
         </p:nvCxnSpPr>
         <p:spPr>
           <a:xfrm flipV="1">
-            <a:off x="7910195" y="974090"/>
-            <a:ext cx="0" cy="301625"/>
+            <a:off x="9321800" y="974090"/>
+            <a:ext cx="0" cy="285115"/>
           </a:xfrm>
           <a:prstGeom prst="straightConnector1">
             <a:avLst/>
@@ -13008,7 +12852,7 @@
         </p:nvCxnSpPr>
         <p:spPr>
           <a:xfrm rot="10800000" flipV="1">
-            <a:off x="6364605" y="898525"/>
+            <a:off x="7776210" y="898525"/>
             <a:ext cx="1304925" cy="342265"/>
           </a:xfrm>
           <a:prstGeom prst="bentConnector2">
@@ -13038,14 +12882,14 @@
           <p:cNvPr id="95" name="Elbow Connector 94"/>
           <p:cNvCxnSpPr>
             <a:stCxn id="56" idx="2"/>
-            <a:endCxn id="96" idx="6"/>
+            <a:endCxn id="102" idx="3"/>
           </p:cNvCxnSpPr>
           <p:nvPr/>
         </p:nvCxnSpPr>
         <p:spPr>
           <a:xfrm rot="5400000">
-            <a:off x="2311718" y="1838643"/>
-            <a:ext cx="406400" cy="1325245"/>
+            <a:off x="4121150" y="2240915"/>
+            <a:ext cx="410845" cy="525145"/>
           </a:xfrm>
           <a:prstGeom prst="bentConnector2">
             <a:avLst/>
@@ -13129,7 +12973,7 @@
         </p:nvCxnSpPr>
         <p:spPr>
           <a:xfrm rot="5400000">
-            <a:off x="4355465" y="694690"/>
+            <a:off x="5767070" y="694690"/>
             <a:ext cx="913765" cy="3105785"/>
           </a:xfrm>
           <a:prstGeom prst="bentConnector2">
@@ -13162,7 +13006,7 @@
         </p:nvSpPr>
         <p:spPr>
           <a:xfrm>
-            <a:off x="3094990" y="2616200"/>
+            <a:off x="4506595" y="2616200"/>
             <a:ext cx="164465" cy="177165"/>
           </a:xfrm>
           <a:prstGeom prst="ellipse">
@@ -13195,9 +13039,231 @@
           </a:p>
         </p:txBody>
       </p:sp>
+      <p:sp>
+        <p:nvSpPr>
+          <p:cNvPr id="279" name="Text Box 278"/>
+          <p:cNvSpPr txBox="1"/>
+          <p:nvPr/>
+        </p:nvSpPr>
+        <p:spPr>
+          <a:xfrm>
+            <a:off x="10534015" y="191770"/>
+            <a:ext cx="1379855" cy="398780"/>
+          </a:xfrm>
+          <a:prstGeom prst="rect">
+            <a:avLst/>
+          </a:prstGeom>
+        </p:spPr>
+        <p:style>
+          <a:lnRef idx="1">
+            <a:schemeClr val="accent5"/>
+          </a:lnRef>
+          <a:fillRef idx="2">
+            <a:schemeClr val="accent5"/>
+          </a:fillRef>
+          <a:effectRef idx="1">
+            <a:schemeClr val="accent5"/>
+          </a:effectRef>
+          <a:fontRef idx="minor">
+            <a:schemeClr val="dk1"/>
+          </a:fontRef>
+        </p:style>
+        <p:txBody>
+          <a:bodyPr wrap="square" rtlCol="0">
+            <a:spAutoFit/>
+          </a:bodyPr>
+          <a:p>
+            <a:r>
+              <a:rPr lang="en-US" sz="1000"/>
+              <a:t>Fibonacci Flow</a:t>
+            </a:r>
+            <a:endParaRPr lang="en-US" sz="1000"/>
+          </a:p>
+          <a:p>
+            <a:r>
+              <a:rPr lang="en-US" sz="1000"/>
+              <a:t>04/15/2025</a:t>
+            </a:r>
+            <a:endParaRPr lang="en-US" sz="1000"/>
+          </a:p>
+        </p:txBody>
+      </p:sp>
+      <p:grpSp>
+        <p:nvGrpSpPr>
+          <p:cNvPr id="100" name="Group 99"/>
+          <p:cNvGrpSpPr/>
+          <p:nvPr/>
+        </p:nvGrpSpPr>
+        <p:grpSpPr>
+          <a:xfrm>
+            <a:off x="2886075" y="2472690"/>
+            <a:ext cx="1177925" cy="307975"/>
+            <a:chOff x="1542" y="6592"/>
+            <a:chExt cx="1855" cy="485"/>
+          </a:xfrm>
+        </p:grpSpPr>
+        <p:sp>
+          <p:nvSpPr>
+            <p:cNvPr id="101" name="Rectangles 100"/>
+            <p:cNvSpPr/>
+            <p:nvPr/>
+          </p:nvSpPr>
+          <p:spPr>
+            <a:xfrm>
+              <a:off x="1542" y="6592"/>
+              <a:ext cx="1855" cy="226"/>
+            </a:xfrm>
+            <a:prstGeom prst="rect">
+              <a:avLst/>
+            </a:prstGeom>
+          </p:spPr>
+          <p:style>
+            <a:lnRef idx="2">
+              <a:schemeClr val="dk1">
+                <a:shade val="50000"/>
+              </a:schemeClr>
+            </a:lnRef>
+            <a:fillRef idx="1">
+              <a:schemeClr val="dk1"/>
+            </a:fillRef>
+            <a:effectRef idx="0">
+              <a:schemeClr val="dk1"/>
+            </a:effectRef>
+            <a:fontRef idx="minor">
+              <a:schemeClr val="lt1"/>
+            </a:fontRef>
+          </p:style>
+          <p:txBody>
+            <a:bodyPr rtlCol="0" anchor="ctr"/>
+            <a:p>
+              <a:pPr algn="ctr"/>
+              <a:r>
+                <a:rPr lang="en-US" sz="800"/>
+                <a:t>Retrace</a:t>
+              </a:r>
+              <a:endParaRPr lang="en-US" sz="800"/>
+            </a:p>
+          </p:txBody>
+        </p:sp>
+        <p:sp>
+          <p:nvSpPr>
+            <p:cNvPr id="102" name="Rectangles 101"/>
+            <p:cNvSpPr/>
+            <p:nvPr/>
+          </p:nvSpPr>
+          <p:spPr>
+            <a:xfrm>
+              <a:off x="1542" y="6851"/>
+              <a:ext cx="1855" cy="226"/>
+            </a:xfrm>
+            <a:prstGeom prst="rect">
+              <a:avLst/>
+            </a:prstGeom>
+          </p:spPr>
+          <p:style>
+            <a:lnRef idx="2">
+              <a:schemeClr val="accent1">
+                <a:shade val="50000"/>
+              </a:schemeClr>
+            </a:lnRef>
+            <a:fillRef idx="1">
+              <a:schemeClr val="accent1"/>
+            </a:fillRef>
+            <a:effectRef idx="0">
+              <a:schemeClr val="accent1"/>
+            </a:effectRef>
+            <a:fontRef idx="minor">
+              <a:schemeClr val="lt1"/>
+            </a:fontRef>
+          </p:style>
+          <p:txBody>
+            <a:bodyPr rtlCol="0" anchor="ctr"/>
+            <a:p>
+              <a:pPr algn="ctr"/>
+              <a:r>
+                <a:rPr lang="en-US" sz="800"/>
+                <a:t>Initialize Retrace</a:t>
+              </a:r>
+              <a:endParaRPr lang="en-US" sz="800"/>
+            </a:p>
+          </p:txBody>
+        </p:sp>
+      </p:grpSp>
+      <p:cxnSp>
+        <p:nvCxnSpPr>
+          <p:cNvPr id="105" name="Straight Arrow Connector 104"/>
+          <p:cNvCxnSpPr>
+            <a:stCxn id="102" idx="1"/>
+            <a:endCxn id="96" idx="6"/>
+          </p:cNvCxnSpPr>
+          <p:nvPr/>
+        </p:nvCxnSpPr>
+        <p:spPr>
+          <a:xfrm flipH="1" flipV="1">
+            <a:off x="1852295" y="2704465"/>
+            <a:ext cx="1033780" cy="4445"/>
+          </a:xfrm>
+          <a:prstGeom prst="straightConnector1">
+            <a:avLst/>
+          </a:prstGeom>
+          <a:ln>
+            <a:tailEnd type="arrow"/>
+          </a:ln>
+        </p:spPr>
+        <p:style>
+          <a:lnRef idx="1">
+            <a:schemeClr val="accent1"/>
+          </a:lnRef>
+          <a:fillRef idx="0">
+            <a:schemeClr val="accent1"/>
+          </a:fillRef>
+          <a:effectRef idx="0">
+            <a:schemeClr val="accent1"/>
+          </a:effectRef>
+          <a:fontRef idx="minor">
+            <a:schemeClr val="tx1"/>
+          </a:fontRef>
+        </p:style>
+      </p:cxnSp>
+      <p:cxnSp>
+        <p:nvCxnSpPr>
+          <p:cNvPr id="106" name="Straight Arrow Connector 105"/>
+          <p:cNvCxnSpPr>
+            <a:stCxn id="96" idx="4"/>
+            <a:endCxn id="12" idx="0"/>
+          </p:cNvCxnSpPr>
+          <p:nvPr/>
+        </p:nvCxnSpPr>
+        <p:spPr>
+          <a:xfrm>
+            <a:off x="1701800" y="2863850"/>
+            <a:ext cx="6985" cy="955040"/>
+          </a:xfrm>
+          <a:prstGeom prst="straightConnector1">
+            <a:avLst/>
+          </a:prstGeom>
+          <a:ln>
+            <a:tailEnd type="arrow"/>
+          </a:ln>
+        </p:spPr>
+        <p:style>
+          <a:lnRef idx="1">
+            <a:schemeClr val="accent1"/>
+          </a:lnRef>
+          <a:fillRef idx="0">
+            <a:schemeClr val="accent1"/>
+          </a:fillRef>
+          <a:effectRef idx="0">
+            <a:schemeClr val="accent1"/>
+          </a:effectRef>
+          <a:fontRef idx="minor">
+            <a:schemeClr val="tx1"/>
+          </a:fontRef>
+        </p:style>
+      </p:cxnSp>
       <p:pic>
         <p:nvPicPr>
-          <p:cNvPr id="98" name="Picture 97"/>
+          <p:cNvPr id="109" name="Picture 108"/>
           <p:cNvPicPr>
             <a:picLocks noChangeAspect="1"/>
           </p:cNvPicPr>
@@ -13211,63 +13277,14 @@
         </p:blipFill>
         <p:spPr>
           <a:xfrm>
-            <a:off x="7373620" y="2106295"/>
-            <a:ext cx="4237990" cy="4474845"/>
+            <a:off x="8023860" y="2292985"/>
+            <a:ext cx="3855085" cy="4241165"/>
           </a:xfrm>
           <a:prstGeom prst="rect">
             <a:avLst/>
           </a:prstGeom>
         </p:spPr>
       </p:pic>
-      <p:sp>
-        <p:nvSpPr>
-          <p:cNvPr id="279" name="Text Box 278"/>
-          <p:cNvSpPr txBox="1"/>
-          <p:nvPr/>
-        </p:nvSpPr>
-        <p:spPr>
-          <a:xfrm>
-            <a:off x="10534015" y="191770"/>
-            <a:ext cx="1379855" cy="398780"/>
-          </a:xfrm>
-          <a:prstGeom prst="rect">
-            <a:avLst/>
-          </a:prstGeom>
-        </p:spPr>
-        <p:style>
-          <a:lnRef idx="1">
-            <a:schemeClr val="accent5"/>
-          </a:lnRef>
-          <a:fillRef idx="2">
-            <a:schemeClr val="accent5"/>
-          </a:fillRef>
-          <a:effectRef idx="1">
-            <a:schemeClr val="accent5"/>
-          </a:effectRef>
-          <a:fontRef idx="minor">
-            <a:schemeClr val="dk1"/>
-          </a:fontRef>
-        </p:style>
-        <p:txBody>
-          <a:bodyPr wrap="square" rtlCol="0">
-            <a:spAutoFit/>
-          </a:bodyPr>
-          <a:p>
-            <a:r>
-              <a:rPr lang="en-US" sz="1000"/>
-              <a:t>Fibonacci Flow</a:t>
-            </a:r>
-            <a:endParaRPr lang="en-US" sz="1000"/>
-          </a:p>
-          <a:p>
-            <a:r>
-              <a:rPr lang="en-US" sz="1000"/>
-              <a:t>04/15/2025</a:t>
-            </a:r>
-            <a:endParaRPr lang="en-US" sz="1000"/>
-          </a:p>
-        </p:txBody>
-      </p:sp>
     </p:spTree>
   </p:cSld>
   <p:clrMapOvr>

</xml_diff>

<commit_message>
Savepoint; more breaking changes; function (hex) limits found (6.5 byres with rounding to make 7b); blew out in encryption; replacing with a more robust hashkey function hashKey;
</commit_message>
<xml_diff>
--- a/~Documents/FractalFlow.pptx
+++ b/~Documents/FractalFlow.pptx
@@ -5,14 +5,15 @@
     <p:sldMasterId id="2147483648" r:id="rId1"/>
   </p:sldMasterIdLst>
   <p:notesMasterIdLst>
-    <p:notesMasterId r:id="rId5"/>
+    <p:notesMasterId r:id="rId6"/>
   </p:notesMasterIdLst>
   <p:handoutMasterIdLst>
-    <p:handoutMasterId r:id="rId6"/>
+    <p:handoutMasterId r:id="rId7"/>
   </p:handoutMasterIdLst>
   <p:sldIdLst>
     <p:sldId id="256" r:id="rId3"/>
     <p:sldId id="258" r:id="rId4"/>
+    <p:sldId id="259" r:id="rId5"/>
   </p:sldIdLst>
   <p:sldSz cx="12192000" cy="6858000"/>
   <p:notesSz cx="7103745" cy="10234295"/>
@@ -13285,6 +13286,1248 @@
           </a:prstGeom>
         </p:spPr>
       </p:pic>
+    </p:spTree>
+  </p:cSld>
+  <p:clrMapOvr>
+    <a:masterClrMapping/>
+  </p:clrMapOvr>
+</p:sld>
+</file>
+
+<file path=ppt/slides/slide3.xml><?xml version="1.0" encoding="utf-8"?>
+<p:sld xmlns:a="http://schemas.openxmlformats.org/drawingml/2006/main" xmlns:r="http://schemas.openxmlformats.org/officeDocument/2006/relationships" xmlns:p="http://schemas.openxmlformats.org/presentationml/2006/main">
+  <p:cSld>
+    <p:spTree>
+      <p:nvGrpSpPr>
+        <p:cNvPr id="1" name=""/>
+        <p:cNvGrpSpPr/>
+        <p:nvPr/>
+      </p:nvGrpSpPr>
+      <p:grpSpPr/>
+      <p:cxnSp>
+        <p:nvCxnSpPr>
+          <p:cNvPr id="94" name="Elbow Connector 93"/>
+          <p:cNvCxnSpPr>
+            <a:stCxn id="7" idx="1"/>
+            <a:endCxn id="9" idx="0"/>
+          </p:cNvCxnSpPr>
+          <p:nvPr/>
+        </p:nvCxnSpPr>
+        <p:spPr>
+          <a:xfrm rot="10800000" flipV="1">
+            <a:off x="4586605" y="1131570"/>
+            <a:ext cx="1555115" cy="487045"/>
+          </a:xfrm>
+          <a:prstGeom prst="bentConnector2">
+            <a:avLst/>
+          </a:prstGeom>
+          <a:ln>
+            <a:tailEnd type="arrow"/>
+          </a:ln>
+        </p:spPr>
+        <p:style>
+          <a:lnRef idx="1">
+            <a:schemeClr val="accent1"/>
+          </a:lnRef>
+          <a:fillRef idx="0">
+            <a:schemeClr val="accent1"/>
+          </a:fillRef>
+          <a:effectRef idx="0">
+            <a:schemeClr val="accent1"/>
+          </a:effectRef>
+          <a:fontRef idx="minor">
+            <a:schemeClr val="tx1"/>
+          </a:fontRef>
+        </p:style>
+      </p:cxnSp>
+      <p:cxnSp>
+        <p:nvCxnSpPr>
+          <p:cNvPr id="183" name="Straight Arrow Connector 182"/>
+          <p:cNvCxnSpPr/>
+          <p:nvPr/>
+        </p:nvCxnSpPr>
+        <p:spPr>
+          <a:xfrm>
+            <a:off x="3870325" y="1802765"/>
+            <a:ext cx="2101850" cy="4445"/>
+          </a:xfrm>
+          <a:prstGeom prst="straightConnector1">
+            <a:avLst/>
+          </a:prstGeom>
+          <a:ln>
+            <a:tailEnd type="arrow"/>
+          </a:ln>
+        </p:spPr>
+        <p:style>
+          <a:lnRef idx="1">
+            <a:schemeClr val="accent1"/>
+          </a:lnRef>
+          <a:fillRef idx="0">
+            <a:schemeClr val="accent1"/>
+          </a:fillRef>
+          <a:effectRef idx="0">
+            <a:schemeClr val="accent1"/>
+          </a:effectRef>
+          <a:fontRef idx="minor">
+            <a:schemeClr val="tx1"/>
+          </a:fontRef>
+        </p:style>
+      </p:cxnSp>
+      <p:cxnSp>
+        <p:nvCxnSpPr>
+          <p:cNvPr id="50" name="Straight Arrow Connector 49"/>
+          <p:cNvCxnSpPr>
+            <a:stCxn id="9" idx="2"/>
+            <a:endCxn id="83" idx="0"/>
+          </p:cNvCxnSpPr>
+          <p:nvPr/>
+        </p:nvCxnSpPr>
+        <p:spPr>
+          <a:xfrm flipH="1">
+            <a:off x="4577080" y="1986280"/>
+            <a:ext cx="10160" cy="935355"/>
+          </a:xfrm>
+          <a:prstGeom prst="straightConnector1">
+            <a:avLst/>
+          </a:prstGeom>
+          <a:ln>
+            <a:tailEnd type="arrow"/>
+          </a:ln>
+        </p:spPr>
+        <p:style>
+          <a:lnRef idx="1">
+            <a:schemeClr val="accent1"/>
+          </a:lnRef>
+          <a:fillRef idx="0">
+            <a:schemeClr val="accent1"/>
+          </a:fillRef>
+          <a:effectRef idx="0">
+            <a:schemeClr val="accent1"/>
+          </a:effectRef>
+          <a:fontRef idx="minor">
+            <a:schemeClr val="tx1"/>
+          </a:fontRef>
+        </p:style>
+      </p:cxnSp>
+      <p:sp>
+        <p:nvSpPr>
+          <p:cNvPr id="9" name="Flowchart: Decision 8"/>
+          <p:cNvSpPr/>
+          <p:nvPr/>
+        </p:nvSpPr>
+        <p:spPr>
+          <a:xfrm>
+            <a:off x="4168140" y="1619251"/>
+            <a:ext cx="837565" cy="367029"/>
+          </a:xfrm>
+          <a:prstGeom prst="flowChartDecision">
+            <a:avLst/>
+          </a:prstGeom>
+        </p:spPr>
+        <p:style>
+          <a:lnRef idx="1">
+            <a:schemeClr val="accent4"/>
+          </a:lnRef>
+          <a:fillRef idx="2">
+            <a:schemeClr val="accent4"/>
+          </a:fillRef>
+          <a:effectRef idx="1">
+            <a:schemeClr val="accent4"/>
+          </a:effectRef>
+          <a:fontRef idx="minor">
+            <a:schemeClr val="dk1"/>
+          </a:fontRef>
+        </p:style>
+        <p:txBody>
+          <a:bodyPr wrap="square" lIns="0" rIns="0" rtlCol="0" anchor="ctr">
+            <a:spAutoFit/>
+          </a:bodyPr>
+          <a:p>
+            <a:pPr algn="ctr"/>
+            <a:r>
+              <a:rPr lang="en-US" sz="600"/>
+              <a:t>Exists?</a:t>
+            </a:r>
+            <a:endParaRPr lang="en-US" sz="600"/>
+          </a:p>
+        </p:txBody>
+      </p:sp>
+      <p:sp>
+        <p:nvSpPr>
+          <p:cNvPr id="11" name="Oval 10"/>
+          <p:cNvSpPr/>
+          <p:nvPr/>
+        </p:nvSpPr>
+        <p:spPr>
+          <a:xfrm>
+            <a:off x="5257165" y="1717675"/>
+            <a:ext cx="164465" cy="177165"/>
+          </a:xfrm>
+          <a:prstGeom prst="ellipse">
+            <a:avLst/>
+          </a:prstGeom>
+        </p:spPr>
+        <p:style>
+          <a:lnRef idx="1">
+            <a:schemeClr val="accent2"/>
+          </a:lnRef>
+          <a:fillRef idx="2">
+            <a:schemeClr val="accent2"/>
+          </a:fillRef>
+          <a:effectRef idx="1">
+            <a:schemeClr val="accent2"/>
+          </a:effectRef>
+          <a:fontRef idx="minor">
+            <a:schemeClr val="dk1"/>
+          </a:fontRef>
+        </p:style>
+        <p:txBody>
+          <a:bodyPr rtlCol="0" anchor="ctr"/>
+          <a:p>
+            <a:pPr algn="ctr"/>
+            <a:r>
+              <a:rPr lang="en-US" sz="700"/>
+              <a:t>n</a:t>
+            </a:r>
+            <a:endParaRPr lang="en-US" sz="700"/>
+          </a:p>
+        </p:txBody>
+      </p:sp>
+      <p:sp>
+        <p:nvSpPr>
+          <p:cNvPr id="107" name="Oval 106"/>
+          <p:cNvSpPr/>
+          <p:nvPr/>
+        </p:nvSpPr>
+        <p:spPr>
+          <a:xfrm>
+            <a:off x="4497070" y="2306955"/>
+            <a:ext cx="164465" cy="177165"/>
+          </a:xfrm>
+          <a:prstGeom prst="ellipse">
+            <a:avLst/>
+          </a:prstGeom>
+        </p:spPr>
+        <p:style>
+          <a:lnRef idx="1">
+            <a:schemeClr val="accent2"/>
+          </a:lnRef>
+          <a:fillRef idx="2">
+            <a:schemeClr val="accent2"/>
+          </a:fillRef>
+          <a:effectRef idx="1">
+            <a:schemeClr val="accent2"/>
+          </a:effectRef>
+          <a:fontRef idx="minor">
+            <a:schemeClr val="dk1"/>
+          </a:fontRef>
+        </p:style>
+        <p:txBody>
+          <a:bodyPr rtlCol="0" anchor="ctr"/>
+          <a:p>
+            <a:pPr algn="ctr"/>
+            <a:r>
+              <a:rPr lang="en-US" sz="700"/>
+              <a:t>y</a:t>
+            </a:r>
+            <a:endParaRPr lang="en-US" sz="700"/>
+          </a:p>
+        </p:txBody>
+      </p:sp>
+      <p:sp>
+        <p:nvSpPr>
+          <p:cNvPr id="46" name="Flowchart: Terminator 45"/>
+          <p:cNvSpPr/>
+          <p:nvPr/>
+        </p:nvSpPr>
+        <p:spPr>
+          <a:xfrm>
+            <a:off x="4818380" y="1058545"/>
+            <a:ext cx="480060" cy="149860"/>
+          </a:xfrm>
+          <a:prstGeom prst="flowChartTerminator">
+            <a:avLst/>
+          </a:prstGeom>
+          <a:solidFill>
+            <a:schemeClr val="accent6">
+              <a:lumMod val="40000"/>
+              <a:lumOff val="60000"/>
+            </a:schemeClr>
+          </a:solidFill>
+          <a:ln>
+            <a:solidFill>
+              <a:schemeClr val="accent6"/>
+            </a:solidFill>
+          </a:ln>
+        </p:spPr>
+        <p:style>
+          <a:lnRef idx="3">
+            <a:schemeClr val="lt1"/>
+          </a:lnRef>
+          <a:fillRef idx="1">
+            <a:schemeClr val="accent6"/>
+          </a:fillRef>
+          <a:effectRef idx="1">
+            <a:schemeClr val="accent6"/>
+          </a:effectRef>
+          <a:fontRef idx="minor">
+            <a:schemeClr val="lt1"/>
+          </a:fontRef>
+        </p:style>
+        <p:txBody>
+          <a:bodyPr rtlCol="0" anchor="ctr"/>
+          <a:p>
+            <a:pPr algn="ctr"/>
+            <a:r>
+              <a:rPr lang="en-US" sz="700">
+                <a:solidFill>
+                  <a:schemeClr val="tx1">
+                    <a:lumMod val="75000"/>
+                    <a:lumOff val="25000"/>
+                  </a:schemeClr>
+                </a:solidFill>
+              </a:rPr>
+              <a:t>next</a:t>
+            </a:r>
+            <a:endParaRPr lang="en-US" sz="700">
+              <a:solidFill>
+                <a:schemeClr val="tx1">
+                  <a:lumMod val="75000"/>
+                  <a:lumOff val="25000"/>
+                </a:schemeClr>
+              </a:solidFill>
+            </a:endParaRPr>
+          </a:p>
+        </p:txBody>
+      </p:sp>
+      <p:cxnSp>
+        <p:nvCxnSpPr>
+          <p:cNvPr id="57" name="Straight Arrow Connector 56"/>
+          <p:cNvCxnSpPr>
+            <a:stCxn id="90" idx="0"/>
+            <a:endCxn id="7" idx="2"/>
+          </p:cNvCxnSpPr>
+          <p:nvPr/>
+        </p:nvCxnSpPr>
+        <p:spPr>
+          <a:xfrm flipH="1" flipV="1">
+            <a:off x="6561455" y="1315720"/>
+            <a:ext cx="635" cy="255270"/>
+          </a:xfrm>
+          <a:prstGeom prst="straightConnector1">
+            <a:avLst/>
+          </a:prstGeom>
+          <a:ln>
+            <a:tailEnd type="arrow"/>
+          </a:ln>
+        </p:spPr>
+        <p:style>
+          <a:lnRef idx="1">
+            <a:schemeClr val="accent1"/>
+          </a:lnRef>
+          <a:fillRef idx="0">
+            <a:schemeClr val="accent1"/>
+          </a:fillRef>
+          <a:effectRef idx="0">
+            <a:schemeClr val="accent1"/>
+          </a:effectRef>
+          <a:fontRef idx="minor">
+            <a:schemeClr val="tx1"/>
+          </a:fontRef>
+        </p:style>
+      </p:cxnSp>
+      <p:sp>
+        <p:nvSpPr>
+          <p:cNvPr id="58" name="Oval 57"/>
+          <p:cNvSpPr/>
+          <p:nvPr/>
+        </p:nvSpPr>
+        <p:spPr>
+          <a:xfrm>
+            <a:off x="5605145" y="1043305"/>
+            <a:ext cx="164465" cy="177165"/>
+          </a:xfrm>
+          <a:prstGeom prst="ellipse">
+            <a:avLst/>
+          </a:prstGeom>
+        </p:spPr>
+        <p:style>
+          <a:lnRef idx="1">
+            <a:schemeClr val="accent2"/>
+          </a:lnRef>
+          <a:fillRef idx="2">
+            <a:schemeClr val="accent2"/>
+          </a:fillRef>
+          <a:effectRef idx="1">
+            <a:schemeClr val="accent2"/>
+          </a:effectRef>
+          <a:fontRef idx="minor">
+            <a:schemeClr val="dk1"/>
+          </a:fontRef>
+        </p:style>
+        <p:txBody>
+          <a:bodyPr rtlCol="0" anchor="ctr"/>
+          <a:p>
+            <a:pPr algn="ctr"/>
+            <a:r>
+              <a:rPr lang="en-US" sz="700"/>
+              <a:t>y</a:t>
+            </a:r>
+            <a:endParaRPr lang="en-US" sz="700"/>
+          </a:p>
+        </p:txBody>
+      </p:sp>
+      <p:cxnSp>
+        <p:nvCxnSpPr>
+          <p:cNvPr id="78" name="Elbow Connector 77"/>
+          <p:cNvCxnSpPr>
+            <a:stCxn id="15" idx="2"/>
+            <a:endCxn id="83" idx="3"/>
+          </p:cNvCxnSpPr>
+          <p:nvPr/>
+        </p:nvCxnSpPr>
+        <p:spPr>
+          <a:xfrm rot="5400000">
+            <a:off x="5644198" y="536893"/>
+            <a:ext cx="1822450" cy="3160395"/>
+          </a:xfrm>
+          <a:prstGeom prst="bentConnector2">
+            <a:avLst/>
+          </a:prstGeom>
+          <a:ln>
+            <a:tailEnd type="arrow"/>
+          </a:ln>
+        </p:spPr>
+        <p:style>
+          <a:lnRef idx="1">
+            <a:schemeClr val="accent1"/>
+          </a:lnRef>
+          <a:fillRef idx="0">
+            <a:schemeClr val="accent1"/>
+          </a:fillRef>
+          <a:effectRef idx="0">
+            <a:schemeClr val="accent1"/>
+          </a:effectRef>
+          <a:fontRef idx="minor">
+            <a:schemeClr val="tx1"/>
+          </a:fontRef>
+        </p:style>
+      </p:cxnSp>
+      <p:cxnSp>
+        <p:nvCxnSpPr>
+          <p:cNvPr id="80" name="Straight Arrow Connector 79"/>
+          <p:cNvCxnSpPr>
+            <a:stCxn id="5" idx="3"/>
+            <a:endCxn id="9" idx="1"/>
+          </p:cNvCxnSpPr>
+          <p:nvPr/>
+        </p:nvCxnSpPr>
+        <p:spPr>
+          <a:xfrm>
+            <a:off x="3682365" y="1802765"/>
+            <a:ext cx="485775" cy="0"/>
+          </a:xfrm>
+          <a:prstGeom prst="straightConnector1">
+            <a:avLst/>
+          </a:prstGeom>
+          <a:ln>
+            <a:tailEnd type="arrow"/>
+          </a:ln>
+        </p:spPr>
+        <p:style>
+          <a:lnRef idx="1">
+            <a:schemeClr val="accent1"/>
+          </a:lnRef>
+          <a:fillRef idx="0">
+            <a:schemeClr val="accent1"/>
+          </a:fillRef>
+          <a:effectRef idx="0">
+            <a:schemeClr val="accent1"/>
+          </a:effectRef>
+          <a:fontRef idx="minor">
+            <a:schemeClr val="tx1"/>
+          </a:fontRef>
+        </p:style>
+      </p:cxnSp>
+      <p:cxnSp>
+        <p:nvCxnSpPr>
+          <p:cNvPr id="81" name="Straight Arrow Connector 80"/>
+          <p:cNvCxnSpPr>
+            <a:stCxn id="2" idx="2"/>
+            <a:endCxn id="4" idx="0"/>
+          </p:cNvCxnSpPr>
+          <p:nvPr/>
+        </p:nvCxnSpPr>
+        <p:spPr>
+          <a:xfrm>
+            <a:off x="3093085" y="1301750"/>
+            <a:ext cx="635" cy="264795"/>
+          </a:xfrm>
+          <a:prstGeom prst="straightConnector1">
+            <a:avLst/>
+          </a:prstGeom>
+          <a:ln>
+            <a:tailEnd type="arrow"/>
+          </a:ln>
+        </p:spPr>
+        <p:style>
+          <a:lnRef idx="1">
+            <a:schemeClr val="accent1"/>
+          </a:lnRef>
+          <a:fillRef idx="0">
+            <a:schemeClr val="accent1"/>
+          </a:fillRef>
+          <a:effectRef idx="0">
+            <a:schemeClr val="accent1"/>
+          </a:effectRef>
+          <a:fontRef idx="minor">
+            <a:schemeClr val="tx1"/>
+          </a:fontRef>
+        </p:style>
+      </p:cxnSp>
+      <p:sp>
+        <p:nvSpPr>
+          <p:cNvPr id="83" name="Flowchart: Terminator 82"/>
+          <p:cNvSpPr/>
+          <p:nvPr/>
+        </p:nvSpPr>
+        <p:spPr>
+          <a:xfrm>
+            <a:off x="4178935" y="2921635"/>
+            <a:ext cx="796290" cy="213360"/>
+          </a:xfrm>
+          <a:prstGeom prst="flowChartTerminator">
+            <a:avLst/>
+          </a:prstGeom>
+          <a:solidFill>
+            <a:schemeClr val="accent6">
+              <a:lumMod val="40000"/>
+              <a:lumOff val="60000"/>
+            </a:schemeClr>
+          </a:solidFill>
+          <a:ln>
+            <a:solidFill>
+              <a:schemeClr val="accent6"/>
+            </a:solidFill>
+          </a:ln>
+        </p:spPr>
+        <p:style>
+          <a:lnRef idx="3">
+            <a:schemeClr val="lt1"/>
+          </a:lnRef>
+          <a:fillRef idx="1">
+            <a:schemeClr val="accent6"/>
+          </a:fillRef>
+          <a:effectRef idx="1">
+            <a:schemeClr val="accent6"/>
+          </a:effectRef>
+          <a:fontRef idx="minor">
+            <a:schemeClr val="lt1"/>
+          </a:fontRef>
+        </p:style>
+        <p:txBody>
+          <a:bodyPr rtlCol="0" anchor="ctr"/>
+          <a:p>
+            <a:pPr algn="ctr"/>
+            <a:r>
+              <a:rPr lang="en-US" sz="900">
+                <a:solidFill>
+                  <a:schemeClr val="tx1">
+                    <a:lumMod val="75000"/>
+                    <a:lumOff val="25000"/>
+                  </a:schemeClr>
+                </a:solidFill>
+              </a:rPr>
+              <a:t>End</a:t>
+            </a:r>
+            <a:endParaRPr lang="en-US" sz="900">
+              <a:solidFill>
+                <a:schemeClr val="tx1">
+                  <a:lumMod val="75000"/>
+                  <a:lumOff val="25000"/>
+                </a:schemeClr>
+              </a:solidFill>
+            </a:endParaRPr>
+          </a:p>
+        </p:txBody>
+      </p:sp>
+      <p:cxnSp>
+        <p:nvCxnSpPr>
+          <p:cNvPr id="89" name="Straight Arrow Connector 88"/>
+          <p:cNvCxnSpPr>
+            <a:stCxn id="7" idx="3"/>
+            <a:endCxn id="15" idx="1"/>
+          </p:cNvCxnSpPr>
+          <p:nvPr/>
+        </p:nvCxnSpPr>
+        <p:spPr>
+          <a:xfrm>
+            <a:off x="6979920" y="1132205"/>
+            <a:ext cx="566420" cy="1905"/>
+          </a:xfrm>
+          <a:prstGeom prst="straightConnector1">
+            <a:avLst/>
+          </a:prstGeom>
+          <a:ln>
+            <a:tailEnd type="arrow"/>
+          </a:ln>
+        </p:spPr>
+        <p:style>
+          <a:lnRef idx="1">
+            <a:schemeClr val="accent1"/>
+          </a:lnRef>
+          <a:fillRef idx="0">
+            <a:schemeClr val="accent1"/>
+          </a:fillRef>
+          <a:effectRef idx="0">
+            <a:schemeClr val="accent1"/>
+          </a:effectRef>
+          <a:fontRef idx="minor">
+            <a:schemeClr val="tx1"/>
+          </a:fontRef>
+        </p:style>
+      </p:cxnSp>
+      <p:sp>
+        <p:nvSpPr>
+          <p:cNvPr id="279" name="Text Box 278"/>
+          <p:cNvSpPr txBox="1"/>
+          <p:nvPr/>
+        </p:nvSpPr>
+        <p:spPr>
+          <a:xfrm>
+            <a:off x="10534015" y="191770"/>
+            <a:ext cx="1379855" cy="398780"/>
+          </a:xfrm>
+          <a:prstGeom prst="rect">
+            <a:avLst/>
+          </a:prstGeom>
+        </p:spPr>
+        <p:style>
+          <a:lnRef idx="1">
+            <a:schemeClr val="accent5"/>
+          </a:lnRef>
+          <a:fillRef idx="2">
+            <a:schemeClr val="accent5"/>
+          </a:fillRef>
+          <a:effectRef idx="1">
+            <a:schemeClr val="accent5"/>
+          </a:effectRef>
+          <a:fontRef idx="minor">
+            <a:schemeClr val="dk1"/>
+          </a:fontRef>
+        </p:style>
+        <p:txBody>
+          <a:bodyPr wrap="square" rtlCol="0">
+            <a:spAutoFit/>
+          </a:bodyPr>
+          <a:p>
+            <a:r>
+              <a:rPr lang="en-US" sz="1000"/>
+              <a:t>Account Flow</a:t>
+            </a:r>
+            <a:endParaRPr lang="en-US" sz="1000"/>
+          </a:p>
+          <a:p>
+            <a:r>
+              <a:rPr lang="en-US" sz="1000"/>
+              <a:t>05/08/2025</a:t>
+            </a:r>
+            <a:endParaRPr lang="en-US" sz="1000"/>
+          </a:p>
+        </p:txBody>
+      </p:sp>
+      <p:sp>
+        <p:nvSpPr>
+          <p:cNvPr id="2" name="Flowchart: Terminator 1"/>
+          <p:cNvSpPr/>
+          <p:nvPr/>
+        </p:nvSpPr>
+        <p:spPr>
+          <a:xfrm>
+            <a:off x="2694940" y="1088390"/>
+            <a:ext cx="796290" cy="213360"/>
+          </a:xfrm>
+          <a:prstGeom prst="flowChartTerminator">
+            <a:avLst/>
+          </a:prstGeom>
+          <a:solidFill>
+            <a:schemeClr val="accent6">
+              <a:lumMod val="40000"/>
+              <a:lumOff val="60000"/>
+            </a:schemeClr>
+          </a:solidFill>
+          <a:ln>
+            <a:solidFill>
+              <a:schemeClr val="accent6"/>
+            </a:solidFill>
+          </a:ln>
+        </p:spPr>
+        <p:style>
+          <a:lnRef idx="3">
+            <a:schemeClr val="lt1"/>
+          </a:lnRef>
+          <a:fillRef idx="1">
+            <a:schemeClr val="accent6"/>
+          </a:fillRef>
+          <a:effectRef idx="1">
+            <a:schemeClr val="accent6"/>
+          </a:effectRef>
+          <a:fontRef idx="minor">
+            <a:schemeClr val="lt1"/>
+          </a:fontRef>
+        </p:style>
+        <p:txBody>
+          <a:bodyPr rtlCol="0" anchor="ctr"/>
+          <a:p>
+            <a:pPr algn="ctr"/>
+            <a:r>
+              <a:rPr lang="en-US" sz="900">
+                <a:solidFill>
+                  <a:schemeClr val="tx1">
+                    <a:lumMod val="75000"/>
+                    <a:lumOff val="25000"/>
+                  </a:schemeClr>
+                </a:solidFill>
+              </a:rPr>
+              <a:t>Start</a:t>
+            </a:r>
+            <a:endParaRPr lang="en-US" sz="900">
+              <a:solidFill>
+                <a:schemeClr val="tx1">
+                  <a:lumMod val="75000"/>
+                  <a:lumOff val="25000"/>
+                </a:schemeClr>
+              </a:solidFill>
+            </a:endParaRPr>
+          </a:p>
+        </p:txBody>
+      </p:sp>
+      <p:grpSp>
+        <p:nvGrpSpPr>
+          <p:cNvPr id="3" name="Group 2"/>
+          <p:cNvGrpSpPr/>
+          <p:nvPr/>
+        </p:nvGrpSpPr>
+        <p:grpSpPr>
+          <a:xfrm>
+            <a:off x="2504440" y="1566545"/>
+            <a:ext cx="1177925" cy="307975"/>
+            <a:chOff x="1542" y="6592"/>
+            <a:chExt cx="1855" cy="485"/>
+          </a:xfrm>
+        </p:grpSpPr>
+        <p:sp>
+          <p:nvSpPr>
+            <p:cNvPr id="4" name="Rectangles 3"/>
+            <p:cNvSpPr/>
+            <p:nvPr/>
+          </p:nvSpPr>
+          <p:spPr>
+            <a:xfrm>
+              <a:off x="1542" y="6592"/>
+              <a:ext cx="1855" cy="226"/>
+            </a:xfrm>
+            <a:prstGeom prst="rect">
+              <a:avLst/>
+            </a:prstGeom>
+          </p:spPr>
+          <p:style>
+            <a:lnRef idx="2">
+              <a:schemeClr val="dk1">
+                <a:shade val="50000"/>
+              </a:schemeClr>
+            </a:lnRef>
+            <a:fillRef idx="1">
+              <a:schemeClr val="dk1"/>
+            </a:fillRef>
+            <a:effectRef idx="0">
+              <a:schemeClr val="dk1"/>
+            </a:effectRef>
+            <a:fontRef idx="minor">
+              <a:schemeClr val="lt1"/>
+            </a:fontRef>
+          </p:style>
+          <p:txBody>
+            <a:bodyPr rtlCol="0" anchor="ctr"/>
+            <a:p>
+              <a:pPr algn="ctr"/>
+              <a:r>
+                <a:rPr lang="en-US" sz="800"/>
+                <a:t>Retrieve</a:t>
+              </a:r>
+              <a:endParaRPr lang="en-US" sz="800"/>
+            </a:p>
+          </p:txBody>
+        </p:sp>
+        <p:sp>
+          <p:nvSpPr>
+            <p:cNvPr id="5" name="Rectangles 4"/>
+            <p:cNvSpPr/>
+            <p:nvPr/>
+          </p:nvSpPr>
+          <p:spPr>
+            <a:xfrm>
+              <a:off x="1542" y="6851"/>
+              <a:ext cx="1855" cy="226"/>
+            </a:xfrm>
+            <a:prstGeom prst="rect">
+              <a:avLst/>
+            </a:prstGeom>
+          </p:spPr>
+          <p:style>
+            <a:lnRef idx="2">
+              <a:schemeClr val="accent1">
+                <a:shade val="50000"/>
+              </a:schemeClr>
+            </a:lnRef>
+            <a:fillRef idx="1">
+              <a:schemeClr val="accent1"/>
+            </a:fillRef>
+            <a:effectRef idx="0">
+              <a:schemeClr val="accent1"/>
+            </a:effectRef>
+            <a:fontRef idx="minor">
+              <a:schemeClr val="lt1"/>
+            </a:fontRef>
+          </p:style>
+          <p:txBody>
+            <a:bodyPr rtlCol="0" anchor="ctr"/>
+            <a:p>
+              <a:pPr algn="ctr"/>
+              <a:r>
+                <a:rPr lang="en-US" sz="800"/>
+                <a:t>env.Accounts</a:t>
+              </a:r>
+              <a:endParaRPr lang="en-US" sz="800"/>
+            </a:p>
+          </p:txBody>
+        </p:sp>
+      </p:grpSp>
+      <p:sp>
+        <p:nvSpPr>
+          <p:cNvPr id="7" name="Flowchart: Decision 6"/>
+          <p:cNvSpPr/>
+          <p:nvPr/>
+        </p:nvSpPr>
+        <p:spPr>
+          <a:xfrm>
+            <a:off x="6142355" y="948649"/>
+            <a:ext cx="837565" cy="367115"/>
+          </a:xfrm>
+          <a:prstGeom prst="flowChartDecision">
+            <a:avLst/>
+          </a:prstGeom>
+        </p:spPr>
+        <p:style>
+          <a:lnRef idx="1">
+            <a:schemeClr val="accent4"/>
+          </a:lnRef>
+          <a:fillRef idx="2">
+            <a:schemeClr val="accent4"/>
+          </a:fillRef>
+          <a:effectRef idx="1">
+            <a:schemeClr val="accent4"/>
+          </a:effectRef>
+          <a:fontRef idx="minor">
+            <a:schemeClr val="dk1"/>
+          </a:fontRef>
+        </p:style>
+        <p:txBody>
+          <a:bodyPr wrap="square" lIns="0" rIns="0" rtlCol="0" anchor="ctr">
+            <a:spAutoFit/>
+          </a:bodyPr>
+          <a:p>
+            <a:pPr algn="ctr"/>
+            <a:r>
+              <a:rPr lang="en-US" sz="600"/>
+              <a:t>success?</a:t>
+            </a:r>
+            <a:endParaRPr lang="en-US" sz="600"/>
+          </a:p>
+        </p:txBody>
+      </p:sp>
+      <p:grpSp>
+        <p:nvGrpSpPr>
+          <p:cNvPr id="8" name="Group 7"/>
+          <p:cNvGrpSpPr/>
+          <p:nvPr/>
+        </p:nvGrpSpPr>
+        <p:grpSpPr>
+          <a:xfrm>
+            <a:off x="7546340" y="897890"/>
+            <a:ext cx="1177925" cy="307975"/>
+            <a:chOff x="1542" y="6592"/>
+            <a:chExt cx="1855" cy="485"/>
+          </a:xfrm>
+        </p:grpSpPr>
+        <p:sp>
+          <p:nvSpPr>
+            <p:cNvPr id="14" name="Rectangles 13"/>
+            <p:cNvSpPr/>
+            <p:nvPr/>
+          </p:nvSpPr>
+          <p:spPr>
+            <a:xfrm>
+              <a:off x="1542" y="6592"/>
+              <a:ext cx="1855" cy="226"/>
+            </a:xfrm>
+            <a:prstGeom prst="rect">
+              <a:avLst/>
+            </a:prstGeom>
+          </p:spPr>
+          <p:style>
+            <a:lnRef idx="2">
+              <a:schemeClr val="dk1">
+                <a:shade val="50000"/>
+              </a:schemeClr>
+            </a:lnRef>
+            <a:fillRef idx="1">
+              <a:schemeClr val="dk1"/>
+            </a:fillRef>
+            <a:effectRef idx="0">
+              <a:schemeClr val="dk1"/>
+            </a:effectRef>
+            <a:fontRef idx="minor">
+              <a:schemeClr val="lt1"/>
+            </a:fontRef>
+          </p:style>
+          <p:txBody>
+            <a:bodyPr rtlCol="0" anchor="ctr"/>
+            <a:p>
+              <a:pPr algn="ctr"/>
+              <a:r>
+                <a:rPr lang="en-US" sz="800"/>
+                <a:t>Error</a:t>
+              </a:r>
+              <a:endParaRPr lang="en-US" sz="800"/>
+            </a:p>
+          </p:txBody>
+        </p:sp>
+        <p:sp>
+          <p:nvSpPr>
+            <p:cNvPr id="15" name="Rectangles 14"/>
+            <p:cNvSpPr/>
+            <p:nvPr/>
+          </p:nvSpPr>
+          <p:spPr>
+            <a:xfrm>
+              <a:off x="1542" y="6851"/>
+              <a:ext cx="1855" cy="226"/>
+            </a:xfrm>
+            <a:prstGeom prst="rect">
+              <a:avLst/>
+            </a:prstGeom>
+          </p:spPr>
+          <p:style>
+            <a:lnRef idx="2">
+              <a:schemeClr val="accent1">
+                <a:shade val="50000"/>
+              </a:schemeClr>
+            </a:lnRef>
+            <a:fillRef idx="1">
+              <a:schemeClr val="accent1"/>
+            </a:fillRef>
+            <a:effectRef idx="0">
+              <a:schemeClr val="accent1"/>
+            </a:effectRef>
+            <a:fontRef idx="minor">
+              <a:schemeClr val="lt1"/>
+            </a:fontRef>
+          </p:style>
+          <p:txBody>
+            <a:bodyPr rtlCol="0" anchor="ctr"/>
+            <a:p>
+              <a:pPr algn="ctr"/>
+              <a:r>
+                <a:rPr lang="en-US" sz="800"/>
+                <a:t>Handle Crash</a:t>
+              </a:r>
+              <a:endParaRPr lang="en-US" sz="800"/>
+            </a:p>
+          </p:txBody>
+        </p:sp>
+      </p:grpSp>
+      <p:grpSp>
+        <p:nvGrpSpPr>
+          <p:cNvPr id="23" name="Group 22"/>
+          <p:cNvGrpSpPr/>
+          <p:nvPr/>
+        </p:nvGrpSpPr>
+        <p:grpSpPr>
+          <a:xfrm>
+            <a:off x="5972810" y="1570990"/>
+            <a:ext cx="1177290" cy="994410"/>
+            <a:chOff x="9406" y="2474"/>
+            <a:chExt cx="1854" cy="1566"/>
+          </a:xfrm>
+        </p:grpSpPr>
+        <p:sp>
+          <p:nvSpPr>
+            <p:cNvPr id="90" name="Rectangles 89"/>
+            <p:cNvSpPr/>
+            <p:nvPr/>
+          </p:nvSpPr>
+          <p:spPr>
+            <a:xfrm>
+              <a:off x="9406" y="2474"/>
+              <a:ext cx="1855" cy="226"/>
+            </a:xfrm>
+            <a:prstGeom prst="rect">
+              <a:avLst/>
+            </a:prstGeom>
+          </p:spPr>
+          <p:style>
+            <a:lnRef idx="2">
+              <a:schemeClr val="dk1">
+                <a:shade val="50000"/>
+              </a:schemeClr>
+            </a:lnRef>
+            <a:fillRef idx="1">
+              <a:schemeClr val="dk1"/>
+            </a:fillRef>
+            <a:effectRef idx="0">
+              <a:schemeClr val="dk1"/>
+            </a:effectRef>
+            <a:fontRef idx="minor">
+              <a:schemeClr val="lt1"/>
+            </a:fontRef>
+          </p:style>
+          <p:txBody>
+            <a:bodyPr rtlCol="0" anchor="ctr"/>
+            <a:p>
+              <a:pPr algn="ctr"/>
+              <a:r>
+                <a:rPr lang="en-US" sz="800"/>
+                <a:t>Import</a:t>
+              </a:r>
+              <a:endParaRPr lang="en-US" sz="800"/>
+            </a:p>
+          </p:txBody>
+        </p:sp>
+        <p:sp>
+          <p:nvSpPr>
+            <p:cNvPr id="91" name="Rectangles 90"/>
+            <p:cNvSpPr/>
+            <p:nvPr/>
+          </p:nvSpPr>
+          <p:spPr>
+            <a:xfrm>
+              <a:off x="9406" y="2738"/>
+              <a:ext cx="1855" cy="230"/>
+            </a:xfrm>
+            <a:prstGeom prst="rect">
+              <a:avLst/>
+            </a:prstGeom>
+          </p:spPr>
+          <p:style>
+            <a:lnRef idx="2">
+              <a:schemeClr val="accent1">
+                <a:shade val="50000"/>
+              </a:schemeClr>
+            </a:lnRef>
+            <a:fillRef idx="1">
+              <a:schemeClr val="accent1"/>
+            </a:fillRef>
+            <a:effectRef idx="0">
+              <a:schemeClr val="accent1"/>
+            </a:effectRef>
+            <a:fontRef idx="minor">
+              <a:schemeClr val="lt1"/>
+            </a:fontRef>
+          </p:style>
+          <p:txBody>
+            <a:bodyPr rtlCol="0" anchor="ctr"/>
+            <a:p>
+              <a:pPr algn="ctr"/>
+              <a:r>
+                <a:rPr lang="en-US" sz="800"/>
+                <a:t>setOwner()</a:t>
+              </a:r>
+              <a:endParaRPr lang="en-US" sz="800"/>
+            </a:p>
+          </p:txBody>
+        </p:sp>
+        <p:sp>
+          <p:nvSpPr>
+            <p:cNvPr id="93" name="Rectangles 92"/>
+            <p:cNvSpPr/>
+            <p:nvPr/>
+          </p:nvSpPr>
+          <p:spPr>
+            <a:xfrm>
+              <a:off x="9406" y="3006"/>
+              <a:ext cx="1855" cy="230"/>
+            </a:xfrm>
+            <a:prstGeom prst="rect">
+              <a:avLst/>
+            </a:prstGeom>
+          </p:spPr>
+          <p:style>
+            <a:lnRef idx="2">
+              <a:schemeClr val="accent1">
+                <a:shade val="50000"/>
+              </a:schemeClr>
+            </a:lnRef>
+            <a:fillRef idx="1">
+              <a:schemeClr val="accent1"/>
+            </a:fillRef>
+            <a:effectRef idx="0">
+              <a:schemeClr val="accent1"/>
+            </a:effectRef>
+            <a:fontRef idx="minor">
+              <a:schemeClr val="lt1"/>
+            </a:fontRef>
+          </p:style>
+          <p:txBody>
+            <a:bodyPr rtlCol="0" anchor="ctr"/>
+            <a:p>
+              <a:pPr algn="ctr"/>
+              <a:r>
+                <a:rPr lang="en-US" sz="800">
+                  <a:sym typeface="+mn-ea"/>
+                </a:rPr>
+                <a:t>setBroker()</a:t>
+              </a:r>
+              <a:endParaRPr lang="en-US" sz="800"/>
+            </a:p>
+          </p:txBody>
+        </p:sp>
+        <p:sp>
+          <p:nvSpPr>
+            <p:cNvPr id="20" name="Rectangles 19"/>
+            <p:cNvSpPr/>
+            <p:nvPr/>
+          </p:nvSpPr>
+          <p:spPr>
+            <a:xfrm>
+              <a:off x="9406" y="3274"/>
+              <a:ext cx="1855" cy="230"/>
+            </a:xfrm>
+            <a:prstGeom prst="rect">
+              <a:avLst/>
+            </a:prstGeom>
+          </p:spPr>
+          <p:style>
+            <a:lnRef idx="2">
+              <a:schemeClr val="accent1">
+                <a:shade val="50000"/>
+              </a:schemeClr>
+            </a:lnRef>
+            <a:fillRef idx="1">
+              <a:schemeClr val="accent1"/>
+            </a:fillRef>
+            <a:effectRef idx="0">
+              <a:schemeClr val="accent1"/>
+            </a:effectRef>
+            <a:fontRef idx="minor">
+              <a:schemeClr val="lt1"/>
+            </a:fontRef>
+          </p:style>
+          <p:txBody>
+            <a:bodyPr rtlCol="0" anchor="ctr"/>
+            <a:p>
+              <a:pPr algn="ctr"/>
+              <a:r>
+                <a:rPr lang="en-US" sz="800">
+                  <a:sym typeface="+mn-ea"/>
+                </a:rPr>
+                <a:t>setPosition()</a:t>
+              </a:r>
+              <a:endParaRPr lang="en-US" sz="800"/>
+            </a:p>
+          </p:txBody>
+        </p:sp>
+        <p:sp>
+          <p:nvSpPr>
+            <p:cNvPr id="21" name="Rectangles 20"/>
+            <p:cNvSpPr/>
+            <p:nvPr/>
+          </p:nvSpPr>
+          <p:spPr>
+            <a:xfrm>
+              <a:off x="9406" y="3542"/>
+              <a:ext cx="1855" cy="230"/>
+            </a:xfrm>
+            <a:prstGeom prst="rect">
+              <a:avLst/>
+            </a:prstGeom>
+          </p:spPr>
+          <p:style>
+            <a:lnRef idx="2">
+              <a:schemeClr val="accent1">
+                <a:shade val="50000"/>
+              </a:schemeClr>
+            </a:lnRef>
+            <a:fillRef idx="1">
+              <a:schemeClr val="accent1"/>
+            </a:fillRef>
+            <a:effectRef idx="0">
+              <a:schemeClr val="accent1"/>
+            </a:effectRef>
+            <a:fontRef idx="minor">
+              <a:schemeClr val="lt1"/>
+            </a:fontRef>
+          </p:style>
+          <p:txBody>
+            <a:bodyPr rtlCol="0" anchor="ctr"/>
+            <a:p>
+              <a:pPr algn="ctr"/>
+              <a:r>
+                <a:rPr lang="en-US" sz="800">
+                  <a:sym typeface="+mn-ea"/>
+                </a:rPr>
+                <a:t>setDescription()</a:t>
+              </a:r>
+              <a:endParaRPr lang="en-US" sz="800"/>
+            </a:p>
+          </p:txBody>
+        </p:sp>
+        <p:sp>
+          <p:nvSpPr>
+            <p:cNvPr id="22" name="Rectangles 21"/>
+            <p:cNvSpPr/>
+            <p:nvPr/>
+          </p:nvSpPr>
+          <p:spPr>
+            <a:xfrm>
+              <a:off x="9406" y="3810"/>
+              <a:ext cx="1855" cy="230"/>
+            </a:xfrm>
+            <a:prstGeom prst="rect">
+              <a:avLst/>
+            </a:prstGeom>
+          </p:spPr>
+          <p:style>
+            <a:lnRef idx="2">
+              <a:schemeClr val="accent1">
+                <a:shade val="50000"/>
+              </a:schemeClr>
+            </a:lnRef>
+            <a:fillRef idx="1">
+              <a:schemeClr val="accent1"/>
+            </a:fillRef>
+            <a:effectRef idx="0">
+              <a:schemeClr val="accent1"/>
+            </a:effectRef>
+            <a:fontRef idx="minor">
+              <a:schemeClr val="lt1"/>
+            </a:fontRef>
+          </p:style>
+          <p:txBody>
+            <a:bodyPr rtlCol="0" anchor="ctr"/>
+            <a:p>
+              <a:pPr algn="ctr"/>
+              <a:r>
+                <a:rPr lang="en-US" sz="800">
+                  <a:sym typeface="+mn-ea"/>
+                </a:rPr>
+                <a:t>setState()</a:t>
+              </a:r>
+              <a:endParaRPr lang="en-US" sz="800"/>
+            </a:p>
+          </p:txBody>
+        </p:sp>
+      </p:grpSp>
     </p:spTree>
   </p:cSld>
   <p:clrMapOvr>

</xml_diff>